<commit_message>
Project presentation & report
Submitting on behalf of team.
</commit_message>
<xml_diff>
--- a/report/presentation.pptx
+++ b/report/presentation.pptx
@@ -20,28 +20,29 @@
     <p:sldId id="265" r:id="rId15"/>
     <p:sldId id="266" r:id="rId16"/>
     <p:sldId id="267" r:id="rId17"/>
+    <p:sldId id="268" r:id="rId18"/>
   </p:sldIdLst>
   <p:sldSz cy="5143500" cx="9144000"/>
   <p:notesSz cx="6858000" cy="9144000"/>
   <p:embeddedFontLst>
     <p:embeddedFont>
       <p:font typeface="Roboto Slab"/>
-      <p:regular r:id="rId18"/>
-      <p:bold r:id="rId19"/>
+      <p:regular r:id="rId19"/>
+      <p:bold r:id="rId20"/>
     </p:embeddedFont>
     <p:embeddedFont>
       <p:font typeface="Proxima Nova"/>
-      <p:regular r:id="rId20"/>
-      <p:bold r:id="rId21"/>
-      <p:italic r:id="rId22"/>
-      <p:boldItalic r:id="rId23"/>
+      <p:regular r:id="rId21"/>
+      <p:bold r:id="rId22"/>
+      <p:italic r:id="rId23"/>
+      <p:boldItalic r:id="rId24"/>
     </p:embeddedFont>
     <p:embeddedFont>
       <p:font typeface="Roboto"/>
-      <p:regular r:id="rId24"/>
-      <p:bold r:id="rId25"/>
-      <p:italic r:id="rId26"/>
-      <p:boldItalic r:id="rId27"/>
+      <p:regular r:id="rId25"/>
+      <p:bold r:id="rId26"/>
+      <p:italic r:id="rId27"/>
+      <p:boldItalic r:id="rId28"/>
     </p:embeddedFont>
   </p:embeddedFontLst>
   <p:defaultTextStyle>
@@ -822,7 +823,7 @@
   <p:cSld>
     <p:spTree>
       <p:nvGrpSpPr>
-        <p:cNvPr id="158" name="Shape 158"/>
+        <p:cNvPr id="136" name="Shape 136"/>
         <p:cNvGrpSpPr/>
         <p:nvPr/>
       </p:nvGrpSpPr>
@@ -836,7 +837,7 @@
       </p:grpSpPr>
       <p:sp>
         <p:nvSpPr>
-          <p:cNvPr id="159" name="Google Shape;159;gadc63d6b91_0_582:notes"/>
+          <p:cNvPr id="137" name="Google Shape;137;gadc63d6b91_0_467:notes"/>
           <p:cNvSpPr/>
           <p:nvPr>
             <p:ph idx="2" type="sldImg"/>
@@ -871,7 +872,7 @@
       </p:sp>
       <p:sp>
         <p:nvSpPr>
-          <p:cNvPr id="160" name="Google Shape;160;gadc63d6b91_0_582:notes"/>
+          <p:cNvPr id="138" name="Google Shape;138;gadc63d6b91_0_467:notes"/>
           <p:cNvSpPr txBox="1"/>
           <p:nvPr>
             <p:ph idx="1" type="body"/>
@@ -921,7 +922,7 @@
   <p:cSld>
     <p:spTree>
       <p:nvGrpSpPr>
-        <p:cNvPr id="165" name="Shape 165"/>
+        <p:cNvPr id="168" name="Shape 168"/>
         <p:cNvGrpSpPr/>
         <p:nvPr/>
       </p:nvGrpSpPr>
@@ -935,7 +936,7 @@
       </p:grpSpPr>
       <p:sp>
         <p:nvSpPr>
-          <p:cNvPr id="166" name="Google Shape;166;gd122c779e8_0_340:notes"/>
+          <p:cNvPr id="169" name="Google Shape;169;gadc63d6b91_0_582:notes"/>
           <p:cNvSpPr/>
           <p:nvPr>
             <p:ph idx="2" type="sldImg"/>
@@ -970,7 +971,7 @@
       </p:sp>
       <p:sp>
         <p:nvSpPr>
-          <p:cNvPr id="167" name="Google Shape;167;gd122c779e8_0_340:notes"/>
+          <p:cNvPr id="170" name="Google Shape;170;gadc63d6b91_0_582:notes"/>
           <p:cNvSpPr txBox="1"/>
           <p:nvPr>
             <p:ph idx="1" type="body"/>
@@ -1020,7 +1021,7 @@
   <p:cSld>
     <p:spTree>
       <p:nvGrpSpPr>
-        <p:cNvPr id="173" name="Shape 173"/>
+        <p:cNvPr id="175" name="Shape 175"/>
         <p:cNvGrpSpPr/>
         <p:nvPr/>
       </p:nvGrpSpPr>
@@ -1034,7 +1035,7 @@
       </p:grpSpPr>
       <p:sp>
         <p:nvSpPr>
-          <p:cNvPr id="174" name="Google Shape;174;gae8417e34a_0_27:notes"/>
+          <p:cNvPr id="176" name="Google Shape;176;gd122c779e8_0_340:notes"/>
           <p:cNvSpPr/>
           <p:nvPr>
             <p:ph idx="2" type="sldImg"/>
@@ -1069,7 +1070,106 @@
       </p:sp>
       <p:sp>
         <p:nvSpPr>
-          <p:cNvPr id="175" name="Google Shape;175;gae8417e34a_0_27:notes"/>
+          <p:cNvPr id="177" name="Google Shape;177;gd122c779e8_0_340:notes"/>
+          <p:cNvSpPr txBox="1"/>
+          <p:nvPr>
+            <p:ph idx="1" type="body"/>
+          </p:nvPr>
+        </p:nvSpPr>
+        <p:spPr>
+          <a:xfrm>
+            <a:off x="685800" y="4343400"/>
+            <a:ext cx="5486400" cy="4114800"/>
+          </a:xfrm>
+          <a:prstGeom prst="rect">
+            <a:avLst/>
+          </a:prstGeom>
+        </p:spPr>
+        <p:txBody>
+          <a:bodyPr anchorCtr="0" anchor="t" bIns="91425" lIns="91425" spcFirstLastPara="1" rIns="91425" wrap="square" tIns="91425">
+            <a:noAutofit/>
+          </a:bodyPr>
+          <a:lstStyle/>
+          <a:p>
+            <a:pPr indent="0" lvl="0" marL="0" rtl="0" algn="l">
+              <a:spcBef>
+                <a:spcPts val="0"/>
+              </a:spcBef>
+              <a:spcAft>
+                <a:spcPts val="0"/>
+              </a:spcAft>
+              <a:buNone/>
+            </a:pPr>
+            <a:r>
+              <a:t/>
+            </a:r>
+            <a:endParaRPr/>
+          </a:p>
+        </p:txBody>
+      </p:sp>
+    </p:spTree>
+  </p:cSld>
+  <p:clrMapOvr>
+    <a:masterClrMapping/>
+  </p:clrMapOvr>
+</p:notes>
+</file>
+
+<file path=ppt/notesSlides/notesSlide13.xml><?xml version="1.0" encoding="utf-8"?>
+<p:notes xmlns:a="http://schemas.openxmlformats.org/drawingml/2006/main" xmlns:r="http://schemas.openxmlformats.org/officeDocument/2006/relationships" xmlns:mc="http://schemas.openxmlformats.org/markup-compatibility/2006" xmlns:mv="urn:schemas-microsoft-com:mac:vml" xmlns:p="http://schemas.openxmlformats.org/presentationml/2006/main" xmlns:c="http://schemas.openxmlformats.org/drawingml/2006/chart" xmlns:dgm="http://schemas.openxmlformats.org/drawingml/2006/diagram" xmlns:o="urn:schemas-microsoft-com:office:office" xmlns:v="urn:schemas-microsoft-com:vml" xmlns:pvml="urn:schemas-microsoft-com:office:powerpoint" xmlns:com="http://schemas.openxmlformats.org/drawingml/2006/compatibility" xmlns:p14="http://schemas.microsoft.com/office/powerpoint/2010/main" xmlns:p15="http://schemas.microsoft.com/office/powerpoint/2012/main" xmlns:ahyp="http://schemas.microsoft.com/office/drawing/2018/hyperlinkcolor" showMasterPhAnim="0" showMasterSp="0">
+  <p:cSld>
+    <p:spTree>
+      <p:nvGrpSpPr>
+        <p:cNvPr id="183" name="Shape 183"/>
+        <p:cNvGrpSpPr/>
+        <p:nvPr/>
+      </p:nvGrpSpPr>
+      <p:grpSpPr>
+        <a:xfrm>
+          <a:off x="0" y="0"/>
+          <a:ext cx="0" cy="0"/>
+          <a:chOff x="0" y="0"/>
+          <a:chExt cx="0" cy="0"/>
+        </a:xfrm>
+      </p:grpSpPr>
+      <p:sp>
+        <p:nvSpPr>
+          <p:cNvPr id="184" name="Google Shape;184;gae8417e34a_0_27:notes"/>
+          <p:cNvSpPr/>
+          <p:nvPr>
+            <p:ph idx="2" type="sldImg"/>
+          </p:nvPr>
+        </p:nvSpPr>
+        <p:spPr>
+          <a:xfrm>
+            <a:off x="381300" y="685800"/>
+            <a:ext cx="6096000" cy="3429000"/>
+          </a:xfrm>
+          <a:custGeom>
+            <a:rect b="b" l="l" r="r" t="t"/>
+            <a:pathLst>
+              <a:path extrusionOk="0" h="120000" w="120000">
+                <a:moveTo>
+                  <a:pt x="0" y="0"/>
+                </a:moveTo>
+                <a:lnTo>
+                  <a:pt x="120000" y="0"/>
+                </a:lnTo>
+                <a:lnTo>
+                  <a:pt x="120000" y="120000"/>
+                </a:lnTo>
+                <a:lnTo>
+                  <a:pt x="0" y="120000"/>
+                </a:lnTo>
+                <a:close/>
+              </a:path>
+            </a:pathLst>
+          </a:custGeom>
+        </p:spPr>
+      </p:sp>
+      <p:sp>
+        <p:nvSpPr>
+          <p:cNvPr id="185" name="Google Shape;185;gae8417e34a_0_27:notes"/>
           <p:cNvSpPr txBox="1"/>
           <p:nvPr>
             <p:ph idx="1" type="body"/>
@@ -1430,7 +1530,7 @@
       </p:grpSpPr>
       <p:sp>
         <p:nvSpPr>
-          <p:cNvPr id="91" name="Google Shape;91;gd122c779e8_0_285:notes"/>
+          <p:cNvPr id="91" name="Google Shape;91;gd127807c69_0_0:notes"/>
           <p:cNvSpPr/>
           <p:nvPr>
             <p:ph idx="2" type="sldImg"/>
@@ -1465,7 +1565,7 @@
       </p:sp>
       <p:sp>
         <p:nvSpPr>
-          <p:cNvPr id="92" name="Google Shape;92;gd122c779e8_0_285:notes"/>
+          <p:cNvPr id="92" name="Google Shape;92;gd127807c69_0_0:notes"/>
           <p:cNvSpPr txBox="1"/>
           <p:nvPr>
             <p:ph idx="1" type="body"/>
@@ -1529,7 +1629,7 @@
       </p:grpSpPr>
       <p:sp>
         <p:nvSpPr>
-          <p:cNvPr id="104" name="Google Shape;104;gd122c779e8_0_303:notes"/>
+          <p:cNvPr id="104" name="Google Shape;104;gd5be9ae8a5_0_0:notes"/>
           <p:cNvSpPr/>
           <p:nvPr>
             <p:ph idx="2" type="sldImg"/>
@@ -1564,7 +1664,7 @@
       </p:sp>
       <p:sp>
         <p:nvSpPr>
-          <p:cNvPr id="105" name="Google Shape;105;gd122c779e8_0_303:notes"/>
+          <p:cNvPr id="105" name="Google Shape;105;gd5be9ae8a5_0_0:notes"/>
           <p:cNvSpPr txBox="1"/>
           <p:nvPr>
             <p:ph idx="1" type="body"/>
@@ -1614,7 +1714,7 @@
   <p:cSld>
     <p:spTree>
       <p:nvGrpSpPr>
-        <p:cNvPr id="110" name="Shape 110"/>
+        <p:cNvPr id="113" name="Shape 113"/>
         <p:cNvGrpSpPr/>
         <p:nvPr/>
       </p:nvGrpSpPr>
@@ -1628,7 +1728,7 @@
       </p:grpSpPr>
       <p:sp>
         <p:nvSpPr>
-          <p:cNvPr id="111" name="Google Shape;111;gd122c779e8_0_321:notes"/>
+          <p:cNvPr id="114" name="Google Shape;114;gd122c779e8_0_303:notes"/>
           <p:cNvSpPr/>
           <p:nvPr>
             <p:ph idx="2" type="sldImg"/>
@@ -1663,7 +1763,7 @@
       </p:sp>
       <p:sp>
         <p:nvSpPr>
-          <p:cNvPr id="112" name="Google Shape;112;gd122c779e8_0_321:notes"/>
+          <p:cNvPr id="115" name="Google Shape;115;gd122c779e8_0_303:notes"/>
           <p:cNvSpPr txBox="1"/>
           <p:nvPr>
             <p:ph idx="1" type="body"/>
@@ -1713,7 +1813,7 @@
   <p:cSld>
     <p:spTree>
       <p:nvGrpSpPr>
-        <p:cNvPr id="119" name="Shape 119"/>
+        <p:cNvPr id="120" name="Shape 120"/>
         <p:cNvGrpSpPr/>
         <p:nvPr/>
       </p:nvGrpSpPr>
@@ -1727,7 +1827,7 @@
       </p:grpSpPr>
       <p:sp>
         <p:nvSpPr>
-          <p:cNvPr id="120" name="Google Shape;120;gd122c779e8_0_312:notes"/>
+          <p:cNvPr id="121" name="Google Shape;121;gd122c779e8_0_321:notes"/>
           <p:cNvSpPr/>
           <p:nvPr>
             <p:ph idx="2" type="sldImg"/>
@@ -1762,7 +1862,7 @@
       </p:sp>
       <p:sp>
         <p:nvSpPr>
-          <p:cNvPr id="121" name="Google Shape;121;gd122c779e8_0_312:notes"/>
+          <p:cNvPr id="122" name="Google Shape;122;gd122c779e8_0_321:notes"/>
           <p:cNvSpPr txBox="1"/>
           <p:nvPr>
             <p:ph idx="1" type="body"/>
@@ -1812,7 +1912,7 @@
   <p:cSld>
     <p:spTree>
       <p:nvGrpSpPr>
-        <p:cNvPr id="126" name="Shape 126"/>
+        <p:cNvPr id="129" name="Shape 129"/>
         <p:cNvGrpSpPr/>
         <p:nvPr/>
       </p:nvGrpSpPr>
@@ -1826,7 +1926,7 @@
       </p:grpSpPr>
       <p:sp>
         <p:nvSpPr>
-          <p:cNvPr id="127" name="Google Shape;127;gadc63d6b91_0_467:notes"/>
+          <p:cNvPr id="130" name="Google Shape;130;gd122c779e8_0_312:notes"/>
           <p:cNvSpPr/>
           <p:nvPr>
             <p:ph idx="2" type="sldImg"/>
@@ -1861,7 +1961,7 @@
       </p:sp>
       <p:sp>
         <p:nvSpPr>
-          <p:cNvPr id="128" name="Google Shape;128;gadc63d6b91_0_467:notes"/>
+          <p:cNvPr id="131" name="Google Shape;131;gd122c779e8_0_312:notes"/>
           <p:cNvSpPr txBox="1"/>
           <p:nvPr>
             <p:ph idx="1" type="body"/>
@@ -7553,7 +7653,1290 @@
     </p:bg>
     <p:spTree>
       <p:nvGrpSpPr>
-        <p:cNvPr id="161" name="Shape 161"/>
+        <p:cNvPr id="139" name="Shape 139"/>
+        <p:cNvGrpSpPr/>
+        <p:nvPr/>
+      </p:nvGrpSpPr>
+      <p:grpSpPr>
+        <a:xfrm>
+          <a:off x="0" y="0"/>
+          <a:ext cx="0" cy="0"/>
+          <a:chOff x="0" y="0"/>
+          <a:chExt cx="0" cy="0"/>
+        </a:xfrm>
+      </p:grpSpPr>
+      <p:grpSp>
+        <p:nvGrpSpPr>
+          <p:cNvPr id="140" name="Google Shape;140;p22"/>
+          <p:cNvGrpSpPr/>
+          <p:nvPr/>
+        </p:nvGrpSpPr>
+        <p:grpSpPr>
+          <a:xfrm>
+            <a:off x="2955078" y="1823523"/>
+            <a:ext cx="1101051" cy="1229192"/>
+            <a:chOff x="1072938" y="238145"/>
+            <a:chExt cx="1440600" cy="1655700"/>
+          </a:xfrm>
+        </p:grpSpPr>
+        <p:sp>
+          <p:nvSpPr>
+            <p:cNvPr id="141" name="Google Shape;141;p22"/>
+            <p:cNvSpPr/>
+            <p:nvPr/>
+          </p:nvSpPr>
+          <p:spPr>
+            <a:xfrm rot="5400000">
+              <a:off x="965388" y="345695"/>
+              <a:ext cx="1655700" cy="1440600"/>
+            </a:xfrm>
+            <a:prstGeom prst="hexagon">
+              <a:avLst>
+                <a:gd fmla="val 25000" name="adj"/>
+                <a:gd fmla="val 115470" name="vf"/>
+              </a:avLst>
+            </a:prstGeom>
+            <a:solidFill>
+              <a:srgbClr val="8BC34A"/>
+            </a:solidFill>
+            <a:ln cap="flat" cmpd="sng" w="15875">
+              <a:solidFill>
+                <a:srgbClr val="FFFFFF"/>
+              </a:solidFill>
+              <a:prstDash val="solid"/>
+              <a:round/>
+              <a:headEnd len="sm" w="sm" type="none"/>
+              <a:tailEnd len="sm" w="sm" type="none"/>
+            </a:ln>
+          </p:spPr>
+          <p:txBody>
+            <a:bodyPr anchorCtr="0" anchor="ctr" bIns="68575" lIns="68575" spcFirstLastPara="1" rIns="68575" wrap="square" tIns="68575">
+              <a:noAutofit/>
+            </a:bodyPr>
+            <a:lstStyle/>
+            <a:p>
+              <a:pPr indent="0" lvl="0" marL="0" rtl="0" algn="l">
+                <a:spcBef>
+                  <a:spcPts val="0"/>
+                </a:spcBef>
+                <a:spcAft>
+                  <a:spcPts val="0"/>
+                </a:spcAft>
+                <a:buNone/>
+              </a:pPr>
+              <a:r>
+                <a:t/>
+              </a:r>
+              <a:endParaRPr/>
+            </a:p>
+          </p:txBody>
+        </p:sp>
+        <p:sp>
+          <p:nvSpPr>
+            <p:cNvPr id="142" name="Google Shape;142;p22"/>
+            <p:cNvSpPr txBox="1"/>
+            <p:nvPr/>
+          </p:nvSpPr>
+          <p:spPr>
+            <a:xfrm>
+              <a:off x="1297460" y="739071"/>
+              <a:ext cx="991500" cy="897000"/>
+            </a:xfrm>
+            <a:prstGeom prst="rect">
+              <a:avLst/>
+            </a:prstGeom>
+            <a:solidFill>
+              <a:srgbClr val="8BC34A"/>
+            </a:solidFill>
+            <a:ln>
+              <a:noFill/>
+            </a:ln>
+          </p:spPr>
+          <p:txBody>
+            <a:bodyPr anchorCtr="0" anchor="ctr" bIns="0" lIns="0" spcFirstLastPara="1" rIns="0" wrap="square" tIns="0">
+              <a:noAutofit/>
+            </a:bodyPr>
+            <a:lstStyle/>
+            <a:p>
+              <a:pPr indent="0" lvl="0" marL="0" rtl="0" algn="ctr">
+                <a:lnSpc>
+                  <a:spcPct val="90000"/>
+                </a:lnSpc>
+                <a:spcBef>
+                  <a:spcPts val="0"/>
+                </a:spcBef>
+                <a:spcAft>
+                  <a:spcPts val="0"/>
+                </a:spcAft>
+                <a:buClr>
+                  <a:srgbClr val="000000"/>
+                </a:buClr>
+                <a:buSzPts val="1200"/>
+                <a:buFont typeface="Arial"/>
+                <a:buNone/>
+              </a:pPr>
+              <a:r>
+                <a:rPr lang="en" sz="1200"/>
+                <a:t>EffNetB6</a:t>
+              </a:r>
+              <a:endParaRPr sz="1300"/>
+            </a:p>
+          </p:txBody>
+        </p:sp>
+      </p:grpSp>
+      <p:sp>
+        <p:nvSpPr>
+          <p:cNvPr id="143" name="Google Shape;143;p22"/>
+          <p:cNvSpPr txBox="1"/>
+          <p:nvPr/>
+        </p:nvSpPr>
+        <p:spPr>
+          <a:xfrm>
+            <a:off x="1951550" y="548350"/>
+            <a:ext cx="208500" cy="33000"/>
+          </a:xfrm>
+          <a:prstGeom prst="rect">
+            <a:avLst/>
+          </a:prstGeom>
+          <a:noFill/>
+          <a:ln>
+            <a:noFill/>
+          </a:ln>
+        </p:spPr>
+        <p:txBody>
+          <a:bodyPr anchorCtr="0" anchor="t" bIns="91425" lIns="91425" spcFirstLastPara="1" rIns="91425" wrap="square" tIns="91425">
+            <a:noAutofit/>
+          </a:bodyPr>
+          <a:lstStyle/>
+          <a:p>
+            <a:pPr indent="0" lvl="0" marL="0" rtl="0" algn="l">
+              <a:spcBef>
+                <a:spcPts val="0"/>
+              </a:spcBef>
+              <a:spcAft>
+                <a:spcPts val="0"/>
+              </a:spcAft>
+              <a:buNone/>
+            </a:pPr>
+            <a:r>
+              <a:t/>
+            </a:r>
+            <a:endParaRPr>
+              <a:latin typeface="Roboto"/>
+              <a:ea typeface="Roboto"/>
+              <a:cs typeface="Roboto"/>
+              <a:sym typeface="Roboto"/>
+            </a:endParaRPr>
+          </a:p>
+        </p:txBody>
+      </p:sp>
+      <p:sp>
+        <p:nvSpPr>
+          <p:cNvPr id="144" name="Google Shape;144;p22"/>
+          <p:cNvSpPr/>
+          <p:nvPr/>
+        </p:nvSpPr>
+        <p:spPr>
+          <a:xfrm rot="5400000">
+            <a:off x="1115075" y="2979050"/>
+            <a:ext cx="1294200" cy="1058700"/>
+          </a:xfrm>
+          <a:prstGeom prst="hexagon">
+            <a:avLst>
+              <a:gd fmla="val 25000" name="adj"/>
+              <a:gd fmla="val 115470" name="vf"/>
+            </a:avLst>
+          </a:prstGeom>
+          <a:solidFill>
+            <a:srgbClr val="8BC34A"/>
+          </a:solidFill>
+          <a:ln cap="flat" cmpd="sng" w="15875">
+            <a:solidFill>
+              <a:srgbClr val="FFFFFF"/>
+            </a:solidFill>
+            <a:prstDash val="solid"/>
+            <a:round/>
+            <a:headEnd len="sm" w="sm" type="none"/>
+            <a:tailEnd len="sm" w="sm" type="none"/>
+          </a:ln>
+        </p:spPr>
+        <p:txBody>
+          <a:bodyPr anchorCtr="0" anchor="ctr" bIns="68575" lIns="68575" spcFirstLastPara="1" rIns="68575" wrap="square" tIns="68575">
+            <a:noAutofit/>
+          </a:bodyPr>
+          <a:lstStyle/>
+          <a:p>
+            <a:pPr indent="0" lvl="0" marL="0" rtl="0" algn="l">
+              <a:spcBef>
+                <a:spcPts val="0"/>
+              </a:spcBef>
+              <a:spcAft>
+                <a:spcPts val="0"/>
+              </a:spcAft>
+              <a:buNone/>
+            </a:pPr>
+            <a:r>
+              <a:t/>
+            </a:r>
+            <a:endParaRPr/>
+          </a:p>
+        </p:txBody>
+      </p:sp>
+      <p:sp>
+        <p:nvSpPr>
+          <p:cNvPr id="145" name="Google Shape;145;p22"/>
+          <p:cNvSpPr txBox="1"/>
+          <p:nvPr/>
+        </p:nvSpPr>
+        <p:spPr>
+          <a:xfrm>
+            <a:off x="1388232" y="3113096"/>
+            <a:ext cx="747900" cy="884400"/>
+          </a:xfrm>
+          <a:prstGeom prst="rect">
+            <a:avLst/>
+          </a:prstGeom>
+          <a:noFill/>
+          <a:ln>
+            <a:noFill/>
+          </a:ln>
+        </p:spPr>
+        <p:txBody>
+          <a:bodyPr anchorCtr="0" anchor="ctr" bIns="45725" lIns="45725" spcFirstLastPara="1" rIns="45725" wrap="square" tIns="45725">
+            <a:noAutofit/>
+          </a:bodyPr>
+          <a:lstStyle/>
+          <a:p>
+            <a:pPr indent="0" lvl="0" marL="0" marR="0" rtl="0" algn="ctr">
+              <a:lnSpc>
+                <a:spcPct val="90000"/>
+              </a:lnSpc>
+              <a:spcBef>
+                <a:spcPts val="400"/>
+              </a:spcBef>
+              <a:spcAft>
+                <a:spcPts val="0"/>
+              </a:spcAft>
+              <a:buClr>
+                <a:srgbClr val="000000"/>
+              </a:buClr>
+              <a:buSzPts val="1200"/>
+              <a:buFont typeface="Arial"/>
+              <a:buNone/>
+            </a:pPr>
+            <a:r>
+              <a:rPr lang="en" sz="1200"/>
+              <a:t>Resnet152</a:t>
+            </a:r>
+            <a:endParaRPr sz="1100"/>
+          </a:p>
+        </p:txBody>
+      </p:sp>
+      <p:sp>
+        <p:nvSpPr>
+          <p:cNvPr id="146" name="Google Shape;146;p22"/>
+          <p:cNvSpPr txBox="1"/>
+          <p:nvPr/>
+        </p:nvSpPr>
+        <p:spPr>
+          <a:xfrm>
+            <a:off x="811382" y="4084971"/>
+            <a:ext cx="747900" cy="884400"/>
+          </a:xfrm>
+          <a:prstGeom prst="rect">
+            <a:avLst/>
+          </a:prstGeom>
+          <a:noFill/>
+          <a:ln>
+            <a:noFill/>
+          </a:ln>
+        </p:spPr>
+        <p:txBody>
+          <a:bodyPr anchorCtr="0" anchor="ctr" bIns="45725" lIns="45725" spcFirstLastPara="1" rIns="45725" wrap="square" tIns="45725">
+            <a:noAutofit/>
+          </a:bodyPr>
+          <a:lstStyle/>
+          <a:p>
+            <a:pPr indent="0" lvl="0" marL="0" marR="0" rtl="0" algn="ctr">
+              <a:lnSpc>
+                <a:spcPct val="90000"/>
+              </a:lnSpc>
+              <a:spcBef>
+                <a:spcPts val="400"/>
+              </a:spcBef>
+              <a:spcAft>
+                <a:spcPts val="0"/>
+              </a:spcAft>
+              <a:buClr>
+                <a:srgbClr val="000000"/>
+              </a:buClr>
+              <a:buSzPts val="1200"/>
+              <a:buFont typeface="Arial"/>
+              <a:buNone/>
+            </a:pPr>
+            <a:r>
+              <a:rPr lang="en" sz="1200"/>
+              <a:t>SVM</a:t>
+            </a:r>
+            <a:endParaRPr sz="1100"/>
+          </a:p>
+        </p:txBody>
+      </p:sp>
+      <p:sp>
+        <p:nvSpPr>
+          <p:cNvPr id="147" name="Google Shape;147;p22"/>
+          <p:cNvSpPr txBox="1"/>
+          <p:nvPr/>
+        </p:nvSpPr>
+        <p:spPr>
+          <a:xfrm>
+            <a:off x="3152795" y="4150771"/>
+            <a:ext cx="747900" cy="884400"/>
+          </a:xfrm>
+          <a:prstGeom prst="rect">
+            <a:avLst/>
+          </a:prstGeom>
+          <a:noFill/>
+          <a:ln>
+            <a:noFill/>
+          </a:ln>
+        </p:spPr>
+        <p:txBody>
+          <a:bodyPr anchorCtr="0" anchor="ctr" bIns="45725" lIns="45725" spcFirstLastPara="1" rIns="45725" wrap="square" tIns="45725">
+            <a:noAutofit/>
+          </a:bodyPr>
+          <a:lstStyle/>
+          <a:p>
+            <a:pPr indent="0" lvl="0" marL="0" marR="0" rtl="0" algn="ctr">
+              <a:lnSpc>
+                <a:spcPct val="90000"/>
+              </a:lnSpc>
+              <a:spcBef>
+                <a:spcPts val="400"/>
+              </a:spcBef>
+              <a:spcAft>
+                <a:spcPts val="0"/>
+              </a:spcAft>
+              <a:buClr>
+                <a:srgbClr val="000000"/>
+              </a:buClr>
+              <a:buSzPts val="1200"/>
+              <a:buFont typeface="Arial"/>
+              <a:buNone/>
+            </a:pPr>
+            <a:r>
+              <a:rPr lang="en" sz="1200"/>
+              <a:t>ML NN</a:t>
+            </a:r>
+            <a:endParaRPr sz="1100"/>
+          </a:p>
+        </p:txBody>
+      </p:sp>
+      <p:sp>
+        <p:nvSpPr>
+          <p:cNvPr id="148" name="Google Shape;148;p22"/>
+          <p:cNvSpPr txBox="1"/>
+          <p:nvPr/>
+        </p:nvSpPr>
+        <p:spPr>
+          <a:xfrm>
+            <a:off x="3152795" y="4150771"/>
+            <a:ext cx="747900" cy="884400"/>
+          </a:xfrm>
+          <a:prstGeom prst="rect">
+            <a:avLst/>
+          </a:prstGeom>
+          <a:noFill/>
+          <a:ln>
+            <a:noFill/>
+          </a:ln>
+        </p:spPr>
+        <p:txBody>
+          <a:bodyPr anchorCtr="0" anchor="ctr" bIns="45725" lIns="45725" spcFirstLastPara="1" rIns="45725" wrap="square" tIns="45725">
+            <a:noAutofit/>
+          </a:bodyPr>
+          <a:lstStyle/>
+          <a:p>
+            <a:pPr indent="0" lvl="0" marL="0" marR="0" rtl="0" algn="ctr">
+              <a:lnSpc>
+                <a:spcPct val="90000"/>
+              </a:lnSpc>
+              <a:spcBef>
+                <a:spcPts val="400"/>
+              </a:spcBef>
+              <a:spcAft>
+                <a:spcPts val="0"/>
+              </a:spcAft>
+              <a:buClr>
+                <a:srgbClr val="000000"/>
+              </a:buClr>
+              <a:buSzPts val="1200"/>
+              <a:buFont typeface="Arial"/>
+              <a:buNone/>
+            </a:pPr>
+            <a:r>
+              <a:rPr lang="en" sz="1200"/>
+              <a:t>ML NN</a:t>
+            </a:r>
+            <a:endParaRPr sz="1100"/>
+          </a:p>
+        </p:txBody>
+      </p:sp>
+      <p:grpSp>
+        <p:nvGrpSpPr>
+          <p:cNvPr id="149" name="Google Shape;149;p22"/>
+          <p:cNvGrpSpPr/>
+          <p:nvPr/>
+        </p:nvGrpSpPr>
+        <p:grpSpPr>
+          <a:xfrm>
+            <a:off x="629956" y="1813145"/>
+            <a:ext cx="3666094" cy="2316101"/>
+            <a:chOff x="1072938" y="234651"/>
+            <a:chExt cx="4888125" cy="3088135"/>
+          </a:xfrm>
+        </p:grpSpPr>
+        <p:sp>
+          <p:nvSpPr>
+            <p:cNvPr id="150" name="Google Shape;150;p22"/>
+            <p:cNvSpPr/>
+            <p:nvPr/>
+          </p:nvSpPr>
+          <p:spPr>
+            <a:xfrm rot="5400000">
+              <a:off x="2509632" y="342201"/>
+              <a:ext cx="1655700" cy="1440600"/>
+            </a:xfrm>
+            <a:prstGeom prst="hexagon">
+              <a:avLst>
+                <a:gd fmla="val 25000" name="adj"/>
+                <a:gd fmla="val 115470" name="vf"/>
+              </a:avLst>
+            </a:prstGeom>
+            <a:solidFill>
+              <a:srgbClr val="FFFF00"/>
+            </a:solidFill>
+            <a:ln cap="flat" cmpd="sng" w="15875">
+              <a:solidFill>
+                <a:srgbClr val="FFFFFF"/>
+              </a:solidFill>
+              <a:prstDash val="solid"/>
+              <a:round/>
+              <a:headEnd len="sm" w="sm" type="none"/>
+              <a:tailEnd len="sm" w="sm" type="none"/>
+            </a:ln>
+          </p:spPr>
+          <p:txBody>
+            <a:bodyPr anchorCtr="0" anchor="ctr" bIns="68575" lIns="68575" spcFirstLastPara="1" rIns="68575" wrap="square" tIns="68575">
+              <a:noAutofit/>
+            </a:bodyPr>
+            <a:lstStyle/>
+            <a:p>
+              <a:pPr indent="0" lvl="0" marL="0" rtl="0" algn="l">
+                <a:spcBef>
+                  <a:spcPts val="0"/>
+                </a:spcBef>
+                <a:spcAft>
+                  <a:spcPts val="0"/>
+                </a:spcAft>
+                <a:buNone/>
+              </a:pPr>
+              <a:r>
+                <a:t/>
+              </a:r>
+              <a:endParaRPr/>
+            </a:p>
+          </p:txBody>
+        </p:sp>
+        <p:sp>
+          <p:nvSpPr>
+            <p:cNvPr id="151" name="Google Shape;151;p22"/>
+            <p:cNvSpPr txBox="1"/>
+            <p:nvPr/>
+          </p:nvSpPr>
+          <p:spPr>
+            <a:xfrm>
+              <a:off x="2841704" y="492684"/>
+              <a:ext cx="991500" cy="1139700"/>
+            </a:xfrm>
+            <a:prstGeom prst="rect">
+              <a:avLst/>
+            </a:prstGeom>
+            <a:noFill/>
+            <a:ln>
+              <a:noFill/>
+            </a:ln>
+          </p:spPr>
+          <p:txBody>
+            <a:bodyPr anchorCtr="0" anchor="ctr" bIns="45725" lIns="45725" spcFirstLastPara="1" rIns="45725" wrap="square" tIns="45725">
+              <a:noAutofit/>
+            </a:bodyPr>
+            <a:lstStyle/>
+            <a:p>
+              <a:pPr indent="0" lvl="0" marL="0" rtl="0" algn="ctr">
+                <a:lnSpc>
+                  <a:spcPct val="90000"/>
+                </a:lnSpc>
+                <a:spcBef>
+                  <a:spcPts val="0"/>
+                </a:spcBef>
+                <a:spcAft>
+                  <a:spcPts val="0"/>
+                </a:spcAft>
+                <a:buClr>
+                  <a:srgbClr val="000000"/>
+                </a:buClr>
+                <a:buSzPts val="1200"/>
+                <a:buFont typeface="Arial"/>
+                <a:buNone/>
+              </a:pPr>
+              <a:r>
+                <a:rPr lang="en" sz="1200"/>
+                <a:t>EffNetB5</a:t>
+              </a:r>
+              <a:endParaRPr sz="1200"/>
+            </a:p>
+          </p:txBody>
+        </p:sp>
+        <p:sp>
+          <p:nvSpPr>
+            <p:cNvPr id="152" name="Google Shape;152;p22"/>
+            <p:cNvSpPr/>
+            <p:nvPr/>
+          </p:nvSpPr>
+          <p:spPr>
+            <a:xfrm>
+              <a:off x="4113063" y="569309"/>
+              <a:ext cx="1848000" cy="993600"/>
+            </a:xfrm>
+            <a:prstGeom prst="rect">
+              <a:avLst/>
+            </a:prstGeom>
+            <a:noFill/>
+            <a:ln>
+              <a:noFill/>
+            </a:ln>
+          </p:spPr>
+          <p:txBody>
+            <a:bodyPr anchorCtr="0" anchor="ctr" bIns="68575" lIns="68575" spcFirstLastPara="1" rIns="68575" wrap="square" tIns="68575">
+              <a:noAutofit/>
+            </a:bodyPr>
+            <a:lstStyle/>
+            <a:p>
+              <a:pPr indent="0" lvl="0" marL="0" rtl="0" algn="l">
+                <a:spcBef>
+                  <a:spcPts val="0"/>
+                </a:spcBef>
+                <a:spcAft>
+                  <a:spcPts val="0"/>
+                </a:spcAft>
+                <a:buNone/>
+              </a:pPr>
+              <a:r>
+                <a:t/>
+              </a:r>
+              <a:endParaRPr/>
+            </a:p>
+          </p:txBody>
+        </p:sp>
+        <p:sp>
+          <p:nvSpPr>
+            <p:cNvPr id="153" name="Google Shape;153;p22"/>
+            <p:cNvSpPr/>
+            <p:nvPr/>
+          </p:nvSpPr>
+          <p:spPr>
+            <a:xfrm rot="5400000">
+              <a:off x="965388" y="345695"/>
+              <a:ext cx="1655700" cy="1440600"/>
+            </a:xfrm>
+            <a:prstGeom prst="hexagon">
+              <a:avLst>
+                <a:gd fmla="val 25000" name="adj"/>
+                <a:gd fmla="val 115470" name="vf"/>
+              </a:avLst>
+            </a:prstGeom>
+            <a:solidFill>
+              <a:srgbClr val="FFFF00"/>
+            </a:solidFill>
+            <a:ln cap="flat" cmpd="sng" w="15875">
+              <a:solidFill>
+                <a:srgbClr val="FFFFFF"/>
+              </a:solidFill>
+              <a:prstDash val="solid"/>
+              <a:round/>
+              <a:headEnd len="sm" w="sm" type="none"/>
+              <a:tailEnd len="sm" w="sm" type="none"/>
+            </a:ln>
+          </p:spPr>
+          <p:txBody>
+            <a:bodyPr anchorCtr="0" anchor="ctr" bIns="68575" lIns="68575" spcFirstLastPara="1" rIns="68575" wrap="square" tIns="68575">
+              <a:noAutofit/>
+            </a:bodyPr>
+            <a:lstStyle/>
+            <a:p>
+              <a:pPr indent="0" lvl="0" marL="0" rtl="0" algn="l">
+                <a:spcBef>
+                  <a:spcPts val="0"/>
+                </a:spcBef>
+                <a:spcAft>
+                  <a:spcPts val="0"/>
+                </a:spcAft>
+                <a:buNone/>
+              </a:pPr>
+              <a:r>
+                <a:t/>
+              </a:r>
+              <a:endParaRPr/>
+            </a:p>
+          </p:txBody>
+        </p:sp>
+        <p:sp>
+          <p:nvSpPr>
+            <p:cNvPr id="154" name="Google Shape;154;p22"/>
+            <p:cNvSpPr txBox="1"/>
+            <p:nvPr/>
+          </p:nvSpPr>
+          <p:spPr>
+            <a:xfrm>
+              <a:off x="1297460" y="496177"/>
+              <a:ext cx="991500" cy="1139700"/>
+            </a:xfrm>
+            <a:prstGeom prst="rect">
+              <a:avLst/>
+            </a:prstGeom>
+            <a:noFill/>
+            <a:ln>
+              <a:noFill/>
+            </a:ln>
+          </p:spPr>
+          <p:txBody>
+            <a:bodyPr anchorCtr="0" anchor="ctr" bIns="0" lIns="0" spcFirstLastPara="1" rIns="0" wrap="square" tIns="0">
+              <a:noAutofit/>
+            </a:bodyPr>
+            <a:lstStyle/>
+            <a:p>
+              <a:pPr indent="0" lvl="0" marL="0" marR="0" rtl="0" algn="ctr">
+                <a:lnSpc>
+                  <a:spcPct val="90000"/>
+                </a:lnSpc>
+                <a:spcBef>
+                  <a:spcPts val="0"/>
+                </a:spcBef>
+                <a:spcAft>
+                  <a:spcPts val="0"/>
+                </a:spcAft>
+                <a:buClr>
+                  <a:srgbClr val="000000"/>
+                </a:buClr>
+                <a:buSzPts val="1200"/>
+                <a:buFont typeface="Arial"/>
+                <a:buNone/>
+              </a:pPr>
+              <a:r>
+                <a:rPr lang="en" sz="1200"/>
+                <a:t>EffNetB3</a:t>
+              </a:r>
+              <a:endParaRPr sz="1100"/>
+            </a:p>
+          </p:txBody>
+        </p:sp>
+        <p:sp>
+          <p:nvSpPr>
+            <p:cNvPr id="155" name="Google Shape;155;p22"/>
+            <p:cNvSpPr/>
+            <p:nvPr/>
+          </p:nvSpPr>
+          <p:spPr>
+            <a:xfrm>
+              <a:off x="1696750" y="1996884"/>
+              <a:ext cx="1788300" cy="993600"/>
+            </a:xfrm>
+            <a:prstGeom prst="rect">
+              <a:avLst/>
+            </a:prstGeom>
+            <a:noFill/>
+            <a:ln>
+              <a:noFill/>
+            </a:ln>
+          </p:spPr>
+          <p:txBody>
+            <a:bodyPr anchorCtr="0" anchor="ctr" bIns="68575" lIns="68575" spcFirstLastPara="1" rIns="68575" wrap="square" tIns="68575">
+              <a:noAutofit/>
+            </a:bodyPr>
+            <a:lstStyle/>
+            <a:p>
+              <a:pPr indent="0" lvl="0" marL="0" rtl="0" algn="l">
+                <a:spcBef>
+                  <a:spcPts val="0"/>
+                </a:spcBef>
+                <a:spcAft>
+                  <a:spcPts val="0"/>
+                </a:spcAft>
+                <a:buNone/>
+              </a:pPr>
+              <a:r>
+                <a:t/>
+              </a:r>
+              <a:endParaRPr sz="1200"/>
+            </a:p>
+          </p:txBody>
+        </p:sp>
+        <p:sp>
+          <p:nvSpPr>
+            <p:cNvPr id="156" name="Google Shape;156;p22"/>
+            <p:cNvSpPr/>
+            <p:nvPr/>
+          </p:nvSpPr>
+          <p:spPr>
+            <a:xfrm rot="5400000">
+              <a:off x="3296123" y="1774637"/>
+              <a:ext cx="1655700" cy="1440600"/>
+            </a:xfrm>
+            <a:prstGeom prst="hexagon">
+              <a:avLst>
+                <a:gd fmla="val 25000" name="adj"/>
+                <a:gd fmla="val 115470" name="vf"/>
+              </a:avLst>
+            </a:prstGeom>
+            <a:solidFill>
+              <a:srgbClr val="FFFF00"/>
+            </a:solidFill>
+            <a:ln cap="flat" cmpd="sng" w="15875">
+              <a:solidFill>
+                <a:srgbClr val="FFFFFF"/>
+              </a:solidFill>
+              <a:prstDash val="solid"/>
+              <a:round/>
+              <a:headEnd len="sm" w="sm" type="none"/>
+              <a:tailEnd len="sm" w="sm" type="none"/>
+            </a:ln>
+          </p:spPr>
+          <p:txBody>
+            <a:bodyPr anchorCtr="0" anchor="ctr" bIns="68575" lIns="68575" spcFirstLastPara="1" rIns="68575" wrap="square" tIns="68575">
+              <a:noAutofit/>
+            </a:bodyPr>
+            <a:lstStyle/>
+            <a:p>
+              <a:pPr indent="0" lvl="0" marL="0" rtl="0" algn="l">
+                <a:spcBef>
+                  <a:spcPts val="0"/>
+                </a:spcBef>
+                <a:spcAft>
+                  <a:spcPts val="0"/>
+                </a:spcAft>
+                <a:buNone/>
+              </a:pPr>
+              <a:r>
+                <a:t/>
+              </a:r>
+              <a:endParaRPr/>
+            </a:p>
+          </p:txBody>
+        </p:sp>
+        <p:sp>
+          <p:nvSpPr>
+            <p:cNvPr id="157" name="Google Shape;157;p22"/>
+            <p:cNvSpPr txBox="1"/>
+            <p:nvPr/>
+          </p:nvSpPr>
+          <p:spPr>
+            <a:xfrm>
+              <a:off x="3628196" y="1925119"/>
+              <a:ext cx="991500" cy="1139700"/>
+            </a:xfrm>
+            <a:prstGeom prst="rect">
+              <a:avLst/>
+            </a:prstGeom>
+            <a:noFill/>
+            <a:ln>
+              <a:noFill/>
+            </a:ln>
+          </p:spPr>
+          <p:txBody>
+            <a:bodyPr anchorCtr="0" anchor="ctr" bIns="0" lIns="0" spcFirstLastPara="1" rIns="0" wrap="square" tIns="0">
+              <a:noAutofit/>
+            </a:bodyPr>
+            <a:lstStyle/>
+            <a:p>
+              <a:pPr indent="0" lvl="0" marL="0" marR="0" rtl="0" algn="ctr">
+                <a:lnSpc>
+                  <a:spcPct val="90000"/>
+                </a:lnSpc>
+                <a:spcBef>
+                  <a:spcPts val="0"/>
+                </a:spcBef>
+                <a:spcAft>
+                  <a:spcPts val="0"/>
+                </a:spcAft>
+                <a:buClr>
+                  <a:srgbClr val="000000"/>
+                </a:buClr>
+                <a:buSzPts val="1500"/>
+                <a:buFont typeface="Arial"/>
+                <a:buNone/>
+              </a:pPr>
+              <a:r>
+                <a:rPr lang="en" sz="1300"/>
+                <a:t>Resnet50</a:t>
+              </a:r>
+              <a:endParaRPr sz="900"/>
+            </a:p>
+          </p:txBody>
+        </p:sp>
+      </p:grpSp>
+      <p:sp>
+        <p:nvSpPr>
+          <p:cNvPr id="158" name="Google Shape;158;p22"/>
+          <p:cNvSpPr txBox="1"/>
+          <p:nvPr/>
+        </p:nvSpPr>
+        <p:spPr>
+          <a:xfrm>
+            <a:off x="3686695" y="3036021"/>
+            <a:ext cx="747900" cy="884400"/>
+          </a:xfrm>
+          <a:prstGeom prst="rect">
+            <a:avLst/>
+          </a:prstGeom>
+          <a:noFill/>
+          <a:ln>
+            <a:noFill/>
+          </a:ln>
+        </p:spPr>
+        <p:txBody>
+          <a:bodyPr anchorCtr="0" anchor="ctr" bIns="45725" lIns="45725" spcFirstLastPara="1" rIns="45725" wrap="square" tIns="45725">
+            <a:noAutofit/>
+          </a:bodyPr>
+          <a:lstStyle/>
+          <a:p>
+            <a:pPr indent="0" lvl="0" marL="0" marR="0" rtl="0" algn="ctr">
+              <a:lnSpc>
+                <a:spcPct val="90000"/>
+              </a:lnSpc>
+              <a:spcBef>
+                <a:spcPts val="400"/>
+              </a:spcBef>
+              <a:spcAft>
+                <a:spcPts val="0"/>
+              </a:spcAft>
+              <a:buClr>
+                <a:srgbClr val="000000"/>
+              </a:buClr>
+              <a:buSzPts val="1200"/>
+              <a:buFont typeface="Arial"/>
+              <a:buNone/>
+            </a:pPr>
+            <a:r>
+              <a:rPr lang="en" sz="1200"/>
+              <a:t>Linear</a:t>
+            </a:r>
+            <a:endParaRPr sz="1100"/>
+          </a:p>
+        </p:txBody>
+      </p:sp>
+      <p:grpSp>
+        <p:nvGrpSpPr>
+          <p:cNvPr id="159" name="Google Shape;159;p22"/>
+          <p:cNvGrpSpPr/>
+          <p:nvPr/>
+        </p:nvGrpSpPr>
+        <p:grpSpPr>
+          <a:xfrm>
+            <a:off x="1211653" y="751398"/>
+            <a:ext cx="1101051" cy="1229192"/>
+            <a:chOff x="1072938" y="238145"/>
+            <a:chExt cx="1440600" cy="1655700"/>
+          </a:xfrm>
+        </p:grpSpPr>
+        <p:sp>
+          <p:nvSpPr>
+            <p:cNvPr id="160" name="Google Shape;160;p22"/>
+            <p:cNvSpPr/>
+            <p:nvPr/>
+          </p:nvSpPr>
+          <p:spPr>
+            <a:xfrm rot="5400000">
+              <a:off x="965388" y="345695"/>
+              <a:ext cx="1655700" cy="1440600"/>
+            </a:xfrm>
+            <a:prstGeom prst="hexagon">
+              <a:avLst>
+                <a:gd fmla="val 25000" name="adj"/>
+                <a:gd fmla="val 115470" name="vf"/>
+              </a:avLst>
+            </a:prstGeom>
+            <a:solidFill>
+              <a:srgbClr val="38761D"/>
+            </a:solidFill>
+            <a:ln cap="flat" cmpd="sng" w="15875">
+              <a:solidFill>
+                <a:srgbClr val="FFFFFF"/>
+              </a:solidFill>
+              <a:prstDash val="solid"/>
+              <a:round/>
+              <a:headEnd len="sm" w="sm" type="none"/>
+              <a:tailEnd len="sm" w="sm" type="none"/>
+            </a:ln>
+          </p:spPr>
+          <p:txBody>
+            <a:bodyPr anchorCtr="0" anchor="ctr" bIns="68575" lIns="68575" spcFirstLastPara="1" rIns="68575" wrap="square" tIns="68575">
+              <a:noAutofit/>
+            </a:bodyPr>
+            <a:lstStyle/>
+            <a:p>
+              <a:pPr indent="0" lvl="0" marL="0" rtl="0" algn="l">
+                <a:spcBef>
+                  <a:spcPts val="0"/>
+                </a:spcBef>
+                <a:spcAft>
+                  <a:spcPts val="0"/>
+                </a:spcAft>
+                <a:buNone/>
+              </a:pPr>
+              <a:r>
+                <a:t/>
+              </a:r>
+              <a:endParaRPr/>
+            </a:p>
+          </p:txBody>
+        </p:sp>
+        <p:sp>
+          <p:nvSpPr>
+            <p:cNvPr id="161" name="Google Shape;161;p22"/>
+            <p:cNvSpPr txBox="1"/>
+            <p:nvPr/>
+          </p:nvSpPr>
+          <p:spPr>
+            <a:xfrm>
+              <a:off x="1297460" y="739071"/>
+              <a:ext cx="991500" cy="897000"/>
+            </a:xfrm>
+            <a:prstGeom prst="rect">
+              <a:avLst/>
+            </a:prstGeom>
+            <a:solidFill>
+              <a:srgbClr val="38761D"/>
+            </a:solidFill>
+            <a:ln>
+              <a:noFill/>
+            </a:ln>
+          </p:spPr>
+          <p:txBody>
+            <a:bodyPr anchorCtr="0" anchor="ctr" bIns="0" lIns="0" spcFirstLastPara="1" rIns="0" wrap="square" tIns="0">
+              <a:noAutofit/>
+            </a:bodyPr>
+            <a:lstStyle/>
+            <a:p>
+              <a:pPr indent="0" lvl="0" marL="0" marR="0" rtl="0" algn="ctr">
+                <a:lnSpc>
+                  <a:spcPct val="90000"/>
+                </a:lnSpc>
+                <a:spcBef>
+                  <a:spcPts val="0"/>
+                </a:spcBef>
+                <a:spcAft>
+                  <a:spcPts val="0"/>
+                </a:spcAft>
+                <a:buClr>
+                  <a:srgbClr val="000000"/>
+                </a:buClr>
+                <a:buSzPts val="1200"/>
+                <a:buFont typeface="Arial"/>
+                <a:buNone/>
+              </a:pPr>
+              <a:r>
+                <a:rPr b="1" lang="en" sz="1600">
+                  <a:solidFill>
+                    <a:srgbClr val="FFFFFF"/>
+                  </a:solidFill>
+                </a:rPr>
+                <a:t>Eca-nfnet-10</a:t>
+              </a:r>
+              <a:endParaRPr b="1" sz="1500">
+                <a:solidFill>
+                  <a:srgbClr val="FFFFFF"/>
+                </a:solidFill>
+              </a:endParaRPr>
+            </a:p>
+          </p:txBody>
+        </p:sp>
+      </p:grpSp>
+      <p:sp>
+        <p:nvSpPr>
+          <p:cNvPr id="162" name="Google Shape;162;p22"/>
+          <p:cNvSpPr txBox="1"/>
+          <p:nvPr/>
+        </p:nvSpPr>
+        <p:spPr>
+          <a:xfrm>
+            <a:off x="528825" y="-170775"/>
+            <a:ext cx="7649700" cy="635400"/>
+          </a:xfrm>
+          <a:prstGeom prst="rect">
+            <a:avLst/>
+          </a:prstGeom>
+          <a:noFill/>
+          <a:ln>
+            <a:noFill/>
+          </a:ln>
+        </p:spPr>
+        <p:txBody>
+          <a:bodyPr anchorCtr="0" anchor="b" bIns="91425" lIns="91425" spcFirstLastPara="1" rIns="91425" wrap="square" tIns="91425">
+            <a:noAutofit/>
+          </a:bodyPr>
+          <a:lstStyle/>
+          <a:p>
+            <a:pPr indent="0" lvl="0" marL="0" rtl="0" algn="ctr">
+              <a:spcBef>
+                <a:spcPts val="0"/>
+              </a:spcBef>
+              <a:spcAft>
+                <a:spcPts val="0"/>
+              </a:spcAft>
+              <a:buNone/>
+            </a:pPr>
+            <a:r>
+              <a:rPr b="1" lang="en" sz="2500">
+                <a:solidFill>
+                  <a:srgbClr val="FFFFFF"/>
+                </a:solidFill>
+                <a:latin typeface="Roboto Slab"/>
+                <a:ea typeface="Roboto Slab"/>
+                <a:cs typeface="Roboto Slab"/>
+                <a:sym typeface="Roboto Slab"/>
+              </a:rPr>
+              <a:t>Algorithm variations &amp; Evaluation</a:t>
+            </a:r>
+            <a:endParaRPr b="1" sz="2500">
+              <a:solidFill>
+                <a:srgbClr val="FFFFFF"/>
+              </a:solidFill>
+              <a:latin typeface="Roboto Slab"/>
+              <a:ea typeface="Roboto Slab"/>
+              <a:cs typeface="Roboto Slab"/>
+              <a:sym typeface="Roboto Slab"/>
+            </a:endParaRPr>
+          </a:p>
+        </p:txBody>
+      </p:sp>
+      <p:pic>
+        <p:nvPicPr>
+          <p:cNvPr id="163" name="Google Shape;163;p22"/>
+          <p:cNvPicPr preferRelativeResize="0"/>
+          <p:nvPr/>
+        </p:nvPicPr>
+        <p:blipFill>
+          <a:blip r:embed="rId3">
+            <a:alphaModFix/>
+          </a:blip>
+          <a:stretch>
+            <a:fillRect/>
+          </a:stretch>
+        </p:blipFill>
+        <p:spPr>
+          <a:xfrm>
+            <a:off x="6585700" y="1232661"/>
+            <a:ext cx="1534293" cy="744495"/>
+          </a:xfrm>
+          <a:prstGeom prst="rect">
+            <a:avLst/>
+          </a:prstGeom>
+          <a:noFill/>
+          <a:ln>
+            <a:noFill/>
+          </a:ln>
+        </p:spPr>
+      </p:pic>
+      <p:pic>
+        <p:nvPicPr>
+          <p:cNvPr id="164" name="Google Shape;164;p22"/>
+          <p:cNvPicPr preferRelativeResize="0"/>
+          <p:nvPr/>
+        </p:nvPicPr>
+        <p:blipFill>
+          <a:blip r:embed="rId4">
+            <a:alphaModFix/>
+          </a:blip>
+          <a:stretch>
+            <a:fillRect/>
+          </a:stretch>
+        </p:blipFill>
+        <p:spPr>
+          <a:xfrm>
+            <a:off x="4572000" y="680075"/>
+            <a:ext cx="3994926" cy="1704075"/>
+          </a:xfrm>
+          <a:prstGeom prst="rect">
+            <a:avLst/>
+          </a:prstGeom>
+          <a:noFill/>
+          <a:ln>
+            <a:noFill/>
+          </a:ln>
+        </p:spPr>
+      </p:pic>
+      <p:pic>
+        <p:nvPicPr>
+          <p:cNvPr id="165" name="Google Shape;165;p22"/>
+          <p:cNvPicPr preferRelativeResize="0"/>
+          <p:nvPr/>
+        </p:nvPicPr>
+        <p:blipFill>
+          <a:blip r:embed="rId5">
+            <a:alphaModFix/>
+          </a:blip>
+          <a:stretch>
+            <a:fillRect/>
+          </a:stretch>
+        </p:blipFill>
+        <p:spPr>
+          <a:xfrm>
+            <a:off x="4571998" y="2841350"/>
+            <a:ext cx="3994926" cy="2129275"/>
+          </a:xfrm>
+          <a:prstGeom prst="rect">
+            <a:avLst/>
+          </a:prstGeom>
+          <a:noFill/>
+          <a:ln>
+            <a:noFill/>
+          </a:ln>
+        </p:spPr>
+      </p:pic>
+      <p:sp>
+        <p:nvSpPr>
+          <p:cNvPr id="166" name="Google Shape;166;p22"/>
+          <p:cNvSpPr txBox="1"/>
+          <p:nvPr>
+            <p:ph idx="4294967295" type="body"/>
+          </p:nvPr>
+        </p:nvSpPr>
+        <p:spPr>
+          <a:xfrm>
+            <a:off x="4650963" y="314700"/>
+            <a:ext cx="3837000" cy="609000"/>
+          </a:xfrm>
+          <a:prstGeom prst="rect">
+            <a:avLst/>
+          </a:prstGeom>
+        </p:spPr>
+        <p:txBody>
+          <a:bodyPr anchorCtr="0" anchor="t" bIns="91425" lIns="91425" spcFirstLastPara="1" rIns="91425" wrap="square" tIns="91425">
+            <a:noAutofit/>
+          </a:bodyPr>
+          <a:lstStyle/>
+          <a:p>
+            <a:pPr indent="0" lvl="0" marL="0" rtl="0" algn="ctr">
+              <a:spcBef>
+                <a:spcPts val="0"/>
+              </a:spcBef>
+              <a:spcAft>
+                <a:spcPts val="1600"/>
+              </a:spcAft>
+              <a:buNone/>
+            </a:pPr>
+            <a:r>
+              <a:rPr b="1" lang="en" sz="1500">
+                <a:solidFill>
+                  <a:srgbClr val="8BC34A"/>
+                </a:solidFill>
+                <a:latin typeface="Georgia"/>
+                <a:ea typeface="Georgia"/>
+                <a:cs typeface="Georgia"/>
+                <a:sym typeface="Georgia"/>
+              </a:rPr>
+              <a:t>Time-T0-Train ~12-20 Epochs</a:t>
+            </a:r>
+            <a:endParaRPr b="1" sz="1500">
+              <a:solidFill>
+                <a:srgbClr val="8BC34A"/>
+              </a:solidFill>
+              <a:latin typeface="Georgia"/>
+              <a:ea typeface="Georgia"/>
+              <a:cs typeface="Georgia"/>
+              <a:sym typeface="Georgia"/>
+            </a:endParaRPr>
+          </a:p>
+        </p:txBody>
+      </p:sp>
+      <p:sp>
+        <p:nvSpPr>
+          <p:cNvPr id="167" name="Google Shape;167;p22"/>
+          <p:cNvSpPr txBox="1"/>
+          <p:nvPr>
+            <p:ph idx="4294967295" type="body"/>
+          </p:nvPr>
+        </p:nvSpPr>
+        <p:spPr>
+          <a:xfrm>
+            <a:off x="4650950" y="2504100"/>
+            <a:ext cx="3837000" cy="609000"/>
+          </a:xfrm>
+          <a:prstGeom prst="rect">
+            <a:avLst/>
+          </a:prstGeom>
+        </p:spPr>
+        <p:txBody>
+          <a:bodyPr anchorCtr="0" anchor="t" bIns="91425" lIns="91425" spcFirstLastPara="1" rIns="91425" wrap="square" tIns="91425">
+            <a:noAutofit/>
+          </a:bodyPr>
+          <a:lstStyle/>
+          <a:p>
+            <a:pPr indent="0" lvl="0" marL="0" rtl="0" algn="ctr">
+              <a:spcBef>
+                <a:spcPts val="0"/>
+              </a:spcBef>
+              <a:spcAft>
+                <a:spcPts val="1600"/>
+              </a:spcAft>
+              <a:buNone/>
+            </a:pPr>
+            <a:r>
+              <a:rPr b="1" lang="en" sz="1500">
+                <a:solidFill>
+                  <a:srgbClr val="8BC34A"/>
+                </a:solidFill>
+                <a:latin typeface="Georgia"/>
+                <a:ea typeface="Georgia"/>
+                <a:cs typeface="Georgia"/>
+                <a:sym typeface="Georgia"/>
+              </a:rPr>
+              <a:t>F1 Score (Kaggle)</a:t>
+            </a:r>
+            <a:endParaRPr b="1" sz="1500">
+              <a:solidFill>
+                <a:srgbClr val="8BC34A"/>
+              </a:solidFill>
+              <a:latin typeface="Georgia"/>
+              <a:ea typeface="Georgia"/>
+              <a:cs typeface="Georgia"/>
+              <a:sym typeface="Georgia"/>
+            </a:endParaRPr>
+          </a:p>
+        </p:txBody>
+      </p:sp>
+    </p:spTree>
+  </p:cSld>
+  <p:clrMapOvr>
+    <a:masterClrMapping/>
+  </p:clrMapOvr>
+</p:sld>
+</file>
+
+<file path=ppt/slides/slide11.xml><?xml version="1.0" encoding="utf-8"?>
+<p:sld xmlns:a="http://schemas.openxmlformats.org/drawingml/2006/main" xmlns:r="http://schemas.openxmlformats.org/officeDocument/2006/relationships" xmlns:mc="http://schemas.openxmlformats.org/markup-compatibility/2006" xmlns:mv="urn:schemas-microsoft-com:mac:vml" xmlns:p="http://schemas.openxmlformats.org/presentationml/2006/main" xmlns:c="http://schemas.openxmlformats.org/drawingml/2006/chart" xmlns:dgm="http://schemas.openxmlformats.org/drawingml/2006/diagram" xmlns:o="urn:schemas-microsoft-com:office:office" xmlns:v="urn:schemas-microsoft-com:vml" xmlns:pvml="urn:schemas-microsoft-com:office:powerpoint" xmlns:com="http://schemas.openxmlformats.org/drawingml/2006/compatibility" xmlns:p14="http://schemas.microsoft.com/office/powerpoint/2010/main" xmlns:p15="http://schemas.microsoft.com/office/powerpoint/2012/main" xmlns:ahyp="http://schemas.microsoft.com/office/drawing/2018/hyperlinkcolor">
+  <p:cSld>
+    <p:bg>
+      <p:bgPr>
+        <a:solidFill>
+          <a:srgbClr val="000000"/>
+        </a:solidFill>
+      </p:bgPr>
+    </p:bg>
+    <p:spTree>
+      <p:nvGrpSpPr>
+        <p:cNvPr id="171" name="Shape 171"/>
         <p:cNvGrpSpPr/>
         <p:nvPr/>
       </p:nvGrpSpPr>
@@ -7567,7 +8950,7 @@
       </p:grpSpPr>
       <p:sp>
         <p:nvSpPr>
-          <p:cNvPr id="162" name="Google Shape;162;p22"/>
+          <p:cNvPr id="172" name="Google Shape;172;p23"/>
           <p:cNvSpPr txBox="1"/>
           <p:nvPr/>
         </p:nvSpPr>
@@ -7956,7 +9339,7 @@
       </p:sp>
       <p:sp>
         <p:nvSpPr>
-          <p:cNvPr id="163" name="Google Shape;163;p22"/>
+          <p:cNvPr id="173" name="Google Shape;173;p23"/>
           <p:cNvSpPr/>
           <p:nvPr/>
         </p:nvSpPr>
@@ -8040,7 +9423,7 @@
       </p:sp>
       <p:sp>
         <p:nvSpPr>
-          <p:cNvPr id="164" name="Google Shape;164;p22"/>
+          <p:cNvPr id="174" name="Google Shape;174;p23"/>
           <p:cNvSpPr txBox="1"/>
           <p:nvPr/>
         </p:nvSpPr>
@@ -8104,12 +9487,12 @@
 </p:sld>
 </file>
 
-<file path=ppt/slides/slide11.xml><?xml version="1.0" encoding="utf-8"?>
+<file path=ppt/slides/slide12.xml><?xml version="1.0" encoding="utf-8"?>
 <p:sld xmlns:a="http://schemas.openxmlformats.org/drawingml/2006/main" xmlns:r="http://schemas.openxmlformats.org/officeDocument/2006/relationships" xmlns:mc="http://schemas.openxmlformats.org/markup-compatibility/2006" xmlns:mv="urn:schemas-microsoft-com:mac:vml" xmlns:p="http://schemas.openxmlformats.org/presentationml/2006/main" xmlns:c="http://schemas.openxmlformats.org/drawingml/2006/chart" xmlns:dgm="http://schemas.openxmlformats.org/drawingml/2006/diagram" xmlns:o="urn:schemas-microsoft-com:office:office" xmlns:v="urn:schemas-microsoft-com:vml" xmlns:pvml="urn:schemas-microsoft-com:office:powerpoint" xmlns:com="http://schemas.openxmlformats.org/drawingml/2006/compatibility" xmlns:p14="http://schemas.microsoft.com/office/powerpoint/2010/main" xmlns:p15="http://schemas.microsoft.com/office/powerpoint/2012/main" xmlns:ahyp="http://schemas.microsoft.com/office/drawing/2018/hyperlinkcolor">
   <p:cSld>
     <p:spTree>
       <p:nvGrpSpPr>
-        <p:cNvPr id="168" name="Shape 168"/>
+        <p:cNvPr id="178" name="Shape 178"/>
         <p:cNvGrpSpPr/>
         <p:nvPr/>
       </p:nvGrpSpPr>
@@ -8123,7 +9506,7 @@
       </p:grpSpPr>
       <p:sp>
         <p:nvSpPr>
-          <p:cNvPr id="169" name="Google Shape;169;p23"/>
+          <p:cNvPr id="179" name="Google Shape;179;p24"/>
           <p:cNvSpPr txBox="1"/>
           <p:nvPr>
             <p:ph type="title"/>
@@ -8173,7 +9556,7 @@
       </p:sp>
       <p:sp>
         <p:nvSpPr>
-          <p:cNvPr id="170" name="Google Shape;170;p23"/>
+          <p:cNvPr id="180" name="Google Shape;180;p24"/>
           <p:cNvSpPr txBox="1"/>
           <p:nvPr>
             <p:ph idx="1" type="subTitle"/>
@@ -8249,7 +9632,7 @@
       </p:sp>
       <p:sp>
         <p:nvSpPr>
-          <p:cNvPr id="171" name="Google Shape;171;p23"/>
+          <p:cNvPr id="181" name="Google Shape;181;p24"/>
           <p:cNvSpPr txBox="1"/>
           <p:nvPr>
             <p:ph idx="2" type="body"/>
@@ -8408,7 +9791,7 @@
       </p:sp>
       <p:sp>
         <p:nvSpPr>
-          <p:cNvPr id="172" name="Google Shape;172;p23"/>
+          <p:cNvPr id="182" name="Google Shape;182;p24"/>
           <p:cNvSpPr txBox="1"/>
           <p:nvPr>
             <p:ph type="title"/>
@@ -8470,12 +9853,12 @@
 </p:sld>
 </file>
 
-<file path=ppt/slides/slide12.xml><?xml version="1.0" encoding="utf-8"?>
+<file path=ppt/slides/slide13.xml><?xml version="1.0" encoding="utf-8"?>
 <p:sld xmlns:a="http://schemas.openxmlformats.org/drawingml/2006/main" xmlns:r="http://schemas.openxmlformats.org/officeDocument/2006/relationships" xmlns:mc="http://schemas.openxmlformats.org/markup-compatibility/2006" xmlns:mv="urn:schemas-microsoft-com:mac:vml" xmlns:p="http://schemas.openxmlformats.org/presentationml/2006/main" xmlns:c="http://schemas.openxmlformats.org/drawingml/2006/chart" xmlns:dgm="http://schemas.openxmlformats.org/drawingml/2006/diagram" xmlns:o="urn:schemas-microsoft-com:office:office" xmlns:v="urn:schemas-microsoft-com:vml" xmlns:pvml="urn:schemas-microsoft-com:office:powerpoint" xmlns:com="http://schemas.openxmlformats.org/drawingml/2006/compatibility" xmlns:p14="http://schemas.microsoft.com/office/powerpoint/2010/main" xmlns:p15="http://schemas.microsoft.com/office/powerpoint/2012/main" xmlns:ahyp="http://schemas.microsoft.com/office/drawing/2018/hyperlinkcolor">
   <p:cSld>
     <p:spTree>
       <p:nvGrpSpPr>
-        <p:cNvPr id="176" name="Shape 176"/>
+        <p:cNvPr id="186" name="Shape 186"/>
         <p:cNvGrpSpPr/>
         <p:nvPr/>
       </p:nvGrpSpPr>
@@ -8489,7 +9872,7 @@
       </p:grpSpPr>
       <p:sp>
         <p:nvSpPr>
-          <p:cNvPr id="177" name="Google Shape;177;p24"/>
+          <p:cNvPr id="187" name="Google Shape;187;p25"/>
           <p:cNvSpPr txBox="1"/>
           <p:nvPr>
             <p:ph type="title"/>
@@ -8574,7 +9957,7 @@
       </p:sp>
       <p:sp>
         <p:nvSpPr>
-          <p:cNvPr id="178" name="Google Shape;178;p24"/>
+          <p:cNvPr id="188" name="Google Shape;188;p25"/>
           <p:cNvSpPr txBox="1"/>
           <p:nvPr>
             <p:ph idx="2" type="body"/>
@@ -8754,7 +10137,7 @@
       </p:sp>
       <p:pic>
         <p:nvPicPr>
-          <p:cNvPr id="179" name="Google Shape;179;p24"/>
+          <p:cNvPr id="189" name="Google Shape;189;p25"/>
           <p:cNvPicPr preferRelativeResize="0"/>
           <p:nvPr/>
         </p:nvPicPr>
@@ -8782,7 +10165,7 @@
       </p:pic>
       <p:pic>
         <p:nvPicPr>
-          <p:cNvPr id="180" name="Google Shape;180;p24"/>
+          <p:cNvPr id="190" name="Google Shape;190;p25"/>
           <p:cNvPicPr preferRelativeResize="0"/>
           <p:nvPr/>
         </p:nvPicPr>
@@ -10649,6 +12032,338 @@
         </p:nvSpPr>
         <p:spPr>
           <a:xfrm>
+            <a:off x="265500" y="157300"/>
+            <a:ext cx="4045200" cy="749400"/>
+          </a:xfrm>
+          <a:prstGeom prst="rect">
+            <a:avLst/>
+          </a:prstGeom>
+        </p:spPr>
+        <p:txBody>
+          <a:bodyPr anchorCtr="0" anchor="b" bIns="91425" lIns="91425" spcFirstLastPara="1" rIns="91425" wrap="square" tIns="91425">
+            <a:noAutofit/>
+          </a:bodyPr>
+          <a:lstStyle/>
+          <a:p>
+            <a:pPr indent="0" lvl="0" marL="0" rtl="0" algn="ctr">
+              <a:spcBef>
+                <a:spcPts val="0"/>
+              </a:spcBef>
+              <a:spcAft>
+                <a:spcPts val="0"/>
+              </a:spcAft>
+              <a:buNone/>
+            </a:pPr>
+            <a:r>
+              <a:rPr lang="en" sz="3400"/>
+              <a:t>Sample train images</a:t>
+            </a:r>
+            <a:endParaRPr sz="3400"/>
+          </a:p>
+        </p:txBody>
+      </p:sp>
+      <p:sp>
+        <p:nvSpPr>
+          <p:cNvPr id="108" name="Google Shape;108;p18"/>
+          <p:cNvSpPr txBox="1"/>
+          <p:nvPr>
+            <p:ph idx="1" type="subTitle"/>
+          </p:nvPr>
+        </p:nvSpPr>
+        <p:spPr>
+          <a:xfrm>
+            <a:off x="265500" y="2769001"/>
+            <a:ext cx="4045200" cy="1345500"/>
+          </a:xfrm>
+          <a:prstGeom prst="rect">
+            <a:avLst/>
+          </a:prstGeom>
+        </p:spPr>
+        <p:txBody>
+          <a:bodyPr anchorCtr="0" anchor="t" bIns="91425" lIns="91425" spcFirstLastPara="1" rIns="91425" wrap="square" tIns="91425">
+            <a:noAutofit/>
+          </a:bodyPr>
+          <a:lstStyle/>
+          <a:p>
+            <a:pPr indent="0" lvl="0" marL="0" rtl="0" algn="ctr">
+              <a:spcBef>
+                <a:spcPts val="0"/>
+              </a:spcBef>
+              <a:spcAft>
+                <a:spcPts val="0"/>
+              </a:spcAft>
+              <a:buNone/>
+            </a:pPr>
+            <a:r>
+              <a:t/>
+            </a:r>
+            <a:endParaRPr/>
+          </a:p>
+        </p:txBody>
+      </p:sp>
+      <p:sp>
+        <p:nvSpPr>
+          <p:cNvPr id="109" name="Google Shape;109;p18"/>
+          <p:cNvSpPr txBox="1"/>
+          <p:nvPr>
+            <p:ph idx="2" type="body"/>
+          </p:nvPr>
+        </p:nvSpPr>
+        <p:spPr>
+          <a:xfrm>
+            <a:off x="4939500" y="354225"/>
+            <a:ext cx="3837000" cy="651900"/>
+          </a:xfrm>
+          <a:prstGeom prst="rect">
+            <a:avLst/>
+          </a:prstGeom>
+        </p:spPr>
+        <p:txBody>
+          <a:bodyPr anchorCtr="0" anchor="ctr" bIns="91425" lIns="91425" spcFirstLastPara="1" rIns="91425" wrap="square" tIns="91425">
+            <a:noAutofit/>
+          </a:bodyPr>
+          <a:lstStyle/>
+          <a:p>
+            <a:pPr indent="0" lvl="0" marL="0" rtl="0" algn="l">
+              <a:spcBef>
+                <a:spcPts val="0"/>
+              </a:spcBef>
+              <a:spcAft>
+                <a:spcPts val="1600"/>
+              </a:spcAft>
+              <a:buNone/>
+            </a:pPr>
+            <a:r>
+              <a:rPr lang="en" sz="3300"/>
+              <a:t>Sample test images</a:t>
+            </a:r>
+            <a:endParaRPr sz="3300"/>
+          </a:p>
+        </p:txBody>
+      </p:sp>
+      <p:pic>
+        <p:nvPicPr>
+          <p:cNvPr id="110" name="Google Shape;110;p18"/>
+          <p:cNvPicPr preferRelativeResize="0"/>
+          <p:nvPr/>
+        </p:nvPicPr>
+        <p:blipFill>
+          <a:blip r:embed="rId3">
+            <a:alphaModFix/>
+          </a:blip>
+          <a:stretch>
+            <a:fillRect/>
+          </a:stretch>
+        </p:blipFill>
+        <p:spPr>
+          <a:xfrm>
+            <a:off x="211788" y="1006025"/>
+            <a:ext cx="4152626" cy="4038275"/>
+          </a:xfrm>
+          <a:prstGeom prst="rect">
+            <a:avLst/>
+          </a:prstGeom>
+          <a:noFill/>
+          <a:ln>
+            <a:noFill/>
+          </a:ln>
+        </p:spPr>
+      </p:pic>
+      <p:pic>
+        <p:nvPicPr>
+          <p:cNvPr id="111" name="Google Shape;111;p18"/>
+          <p:cNvPicPr preferRelativeResize="0"/>
+          <p:nvPr/>
+        </p:nvPicPr>
+        <p:blipFill>
+          <a:blip r:embed="rId4">
+            <a:alphaModFix/>
+          </a:blip>
+          <a:stretch>
+            <a:fillRect/>
+          </a:stretch>
+        </p:blipFill>
+        <p:spPr>
+          <a:xfrm>
+            <a:off x="4695513" y="906700"/>
+            <a:ext cx="4324976" cy="1956875"/>
+          </a:xfrm>
+          <a:prstGeom prst="rect">
+            <a:avLst/>
+          </a:prstGeom>
+          <a:noFill/>
+          <a:ln>
+            <a:noFill/>
+          </a:ln>
+        </p:spPr>
+      </p:pic>
+      <p:sp>
+        <p:nvSpPr>
+          <p:cNvPr id="112" name="Google Shape;112;p18"/>
+          <p:cNvSpPr txBox="1"/>
+          <p:nvPr/>
+        </p:nvSpPr>
+        <p:spPr>
+          <a:xfrm>
+            <a:off x="4695525" y="3083450"/>
+            <a:ext cx="4325100" cy="1405800"/>
+          </a:xfrm>
+          <a:prstGeom prst="rect">
+            <a:avLst/>
+          </a:prstGeom>
+          <a:noFill/>
+          <a:ln>
+            <a:noFill/>
+          </a:ln>
+        </p:spPr>
+        <p:txBody>
+          <a:bodyPr anchorCtr="0" anchor="t" bIns="91425" lIns="91425" spcFirstLastPara="1" rIns="91425" wrap="square" tIns="91425">
+            <a:spAutoFit/>
+          </a:bodyPr>
+          <a:lstStyle/>
+          <a:p>
+            <a:pPr indent="0" lvl="0" marL="0" marR="0" rtl="0" algn="ctr">
+              <a:lnSpc>
+                <a:spcPct val="115000"/>
+              </a:lnSpc>
+              <a:spcBef>
+                <a:spcPts val="0"/>
+              </a:spcBef>
+              <a:spcAft>
+                <a:spcPts val="0"/>
+              </a:spcAft>
+              <a:buNone/>
+            </a:pPr>
+            <a:r>
+              <a:rPr b="1" lang="en" sz="2000">
+                <a:solidFill>
+                  <a:srgbClr val="8BC34A"/>
+                </a:solidFill>
+                <a:latin typeface="Georgia"/>
+                <a:ea typeface="Georgia"/>
+                <a:cs typeface="Georgia"/>
+                <a:sym typeface="Georgia"/>
+              </a:rPr>
+              <a:t>Prediction</a:t>
+            </a:r>
+            <a:r>
+              <a:rPr b="1" lang="en" sz="2000">
+                <a:solidFill>
+                  <a:srgbClr val="8BC34A"/>
+                </a:solidFill>
+                <a:latin typeface="Georgia"/>
+                <a:ea typeface="Georgia"/>
+                <a:cs typeface="Georgia"/>
+                <a:sym typeface="Georgia"/>
+              </a:rPr>
+              <a:t> test size: </a:t>
+            </a:r>
+            <a:r>
+              <a:rPr b="1" lang="en" sz="2000">
+                <a:solidFill>
+                  <a:schemeClr val="lt1"/>
+                </a:solidFill>
+                <a:latin typeface="Georgia"/>
+                <a:ea typeface="Georgia"/>
+                <a:cs typeface="Georgia"/>
+                <a:sym typeface="Georgia"/>
+              </a:rPr>
+              <a:t>3 images</a:t>
+            </a:r>
+            <a:endParaRPr b="1" sz="2000">
+              <a:solidFill>
+                <a:schemeClr val="lt1"/>
+              </a:solidFill>
+              <a:latin typeface="Georgia"/>
+              <a:ea typeface="Georgia"/>
+              <a:cs typeface="Georgia"/>
+              <a:sym typeface="Georgia"/>
+            </a:endParaRPr>
+          </a:p>
+          <a:p>
+            <a:pPr indent="0" lvl="0" marL="0" marR="0" rtl="0" algn="ctr">
+              <a:lnSpc>
+                <a:spcPct val="115000"/>
+              </a:lnSpc>
+              <a:spcBef>
+                <a:spcPts val="1600"/>
+              </a:spcBef>
+              <a:spcAft>
+                <a:spcPts val="1600"/>
+              </a:spcAft>
+              <a:buNone/>
+            </a:pPr>
+            <a:r>
+              <a:rPr b="1" lang="en" sz="2000">
+                <a:solidFill>
+                  <a:srgbClr val="8BC34A"/>
+                </a:solidFill>
+                <a:latin typeface="Georgia"/>
+                <a:ea typeface="Georgia"/>
+                <a:cs typeface="Georgia"/>
+                <a:sym typeface="Georgia"/>
+              </a:rPr>
+              <a:t>Evaluation test size: </a:t>
+            </a:r>
+            <a:r>
+              <a:rPr b="1" lang="en" sz="2000">
+                <a:solidFill>
+                  <a:schemeClr val="lt1"/>
+                </a:solidFill>
+                <a:latin typeface="Georgia"/>
+                <a:ea typeface="Georgia"/>
+                <a:cs typeface="Georgia"/>
+                <a:sym typeface="Georgia"/>
+              </a:rPr>
+              <a:t>70,000 images</a:t>
+            </a:r>
+            <a:endParaRPr b="1" sz="2000">
+              <a:solidFill>
+                <a:schemeClr val="lt1"/>
+              </a:solidFill>
+              <a:latin typeface="Georgia"/>
+              <a:ea typeface="Georgia"/>
+              <a:cs typeface="Georgia"/>
+              <a:sym typeface="Georgia"/>
+            </a:endParaRPr>
+          </a:p>
+        </p:txBody>
+      </p:sp>
+    </p:spTree>
+  </p:cSld>
+  <p:clrMapOvr>
+    <a:masterClrMapping/>
+  </p:clrMapOvr>
+</p:sld>
+</file>
+
+<file path=ppt/slides/slide7.xml><?xml version="1.0" encoding="utf-8"?>
+<p:sld xmlns:a="http://schemas.openxmlformats.org/drawingml/2006/main" xmlns:r="http://schemas.openxmlformats.org/officeDocument/2006/relationships" xmlns:mc="http://schemas.openxmlformats.org/markup-compatibility/2006" xmlns:mv="urn:schemas-microsoft-com:mac:vml" xmlns:p="http://schemas.openxmlformats.org/presentationml/2006/main" xmlns:c="http://schemas.openxmlformats.org/drawingml/2006/chart" xmlns:dgm="http://schemas.openxmlformats.org/drawingml/2006/diagram" xmlns:o="urn:schemas-microsoft-com:office:office" xmlns:v="urn:schemas-microsoft-com:vml" xmlns:pvml="urn:schemas-microsoft-com:office:powerpoint" xmlns:com="http://schemas.openxmlformats.org/drawingml/2006/compatibility" xmlns:p14="http://schemas.microsoft.com/office/powerpoint/2010/main" xmlns:p15="http://schemas.microsoft.com/office/powerpoint/2012/main" xmlns:ahyp="http://schemas.microsoft.com/office/drawing/2018/hyperlinkcolor">
+  <p:cSld>
+    <p:spTree>
+      <p:nvGrpSpPr>
+        <p:cNvPr id="116" name="Shape 116"/>
+        <p:cNvGrpSpPr/>
+        <p:nvPr/>
+      </p:nvGrpSpPr>
+      <p:grpSpPr>
+        <a:xfrm>
+          <a:off x="0" y="0"/>
+          <a:ext cx="0" cy="0"/>
+          <a:chOff x="0" y="0"/>
+          <a:chExt cx="0" cy="0"/>
+        </a:xfrm>
+      </p:grpSpPr>
+      <p:sp>
+        <p:nvSpPr>
+          <p:cNvPr id="117" name="Google Shape;117;p19"/>
+          <p:cNvSpPr txBox="1"/>
+          <p:nvPr>
+            <p:ph type="title"/>
+          </p:nvPr>
+        </p:nvSpPr>
+        <p:spPr>
+          <a:xfrm>
             <a:off x="373550" y="2275"/>
             <a:ext cx="4045200" cy="1509600"/>
           </a:xfrm>
@@ -10697,7 +12412,7 @@
       </p:sp>
       <p:pic>
         <p:nvPicPr>
-          <p:cNvPr id="108" name="Google Shape;108;p18"/>
+          <p:cNvPr id="118" name="Google Shape;118;p19"/>
           <p:cNvPicPr preferRelativeResize="0"/>
           <p:nvPr/>
         </p:nvPicPr>
@@ -10725,7 +12440,7 @@
       </p:pic>
       <p:sp>
         <p:nvSpPr>
-          <p:cNvPr id="109" name="Google Shape;109;p18"/>
+          <p:cNvPr id="119" name="Google Shape;119;p19"/>
           <p:cNvSpPr txBox="1"/>
           <p:nvPr>
             <p:ph idx="1" type="subTitle"/>
@@ -10928,7 +12643,7 @@
 </p:sld>
 </file>
 
-<file path=ppt/slides/slide7.xml><?xml version="1.0" encoding="utf-8"?>
+<file path=ppt/slides/slide8.xml><?xml version="1.0" encoding="utf-8"?>
 <p:sld xmlns:a="http://schemas.openxmlformats.org/drawingml/2006/main" xmlns:r="http://schemas.openxmlformats.org/officeDocument/2006/relationships" xmlns:mc="http://schemas.openxmlformats.org/markup-compatibility/2006" xmlns:mv="urn:schemas-microsoft-com:mac:vml" xmlns:p="http://schemas.openxmlformats.org/presentationml/2006/main" xmlns:c="http://schemas.openxmlformats.org/drawingml/2006/chart" xmlns:dgm="http://schemas.openxmlformats.org/drawingml/2006/diagram" xmlns:o="urn:schemas-microsoft-com:office:office" xmlns:v="urn:schemas-microsoft-com:vml" xmlns:pvml="urn:schemas-microsoft-com:office:powerpoint" xmlns:com="http://schemas.openxmlformats.org/drawingml/2006/compatibility" xmlns:p14="http://schemas.microsoft.com/office/powerpoint/2010/main" xmlns:p15="http://schemas.microsoft.com/office/powerpoint/2012/main" xmlns:ahyp="http://schemas.microsoft.com/office/drawing/2018/hyperlinkcolor">
   <p:cSld>
     <p:bg>
@@ -10940,7 +12655,7 @@
     </p:bg>
     <p:spTree>
       <p:nvGrpSpPr>
-        <p:cNvPr id="113" name="Shape 113"/>
+        <p:cNvPr id="123" name="Shape 123"/>
         <p:cNvGrpSpPr/>
         <p:nvPr/>
       </p:nvGrpSpPr>
@@ -10954,7 +12669,7 @@
       </p:grpSpPr>
       <p:sp>
         <p:nvSpPr>
-          <p:cNvPr id="114" name="Google Shape;114;p19"/>
+          <p:cNvPr id="124" name="Google Shape;124;p20"/>
           <p:cNvSpPr txBox="1"/>
           <p:nvPr>
             <p:ph type="title"/>
@@ -11006,7 +12721,7 @@
       </p:sp>
       <p:sp>
         <p:nvSpPr>
-          <p:cNvPr id="115" name="Google Shape;115;p19"/>
+          <p:cNvPr id="125" name="Google Shape;125;p20"/>
           <p:cNvSpPr txBox="1"/>
           <p:nvPr>
             <p:ph idx="2" type="body"/>
@@ -11062,7 +12777,7 @@
       </p:sp>
       <p:sp>
         <p:nvSpPr>
-          <p:cNvPr id="116" name="Google Shape;116;p19"/>
+          <p:cNvPr id="126" name="Google Shape;126;p20"/>
           <p:cNvSpPr txBox="1"/>
           <p:nvPr>
             <p:ph idx="2" type="body"/>
@@ -11118,7 +12833,7 @@
       </p:sp>
       <p:pic>
         <p:nvPicPr>
-          <p:cNvPr id="117" name="Google Shape;117;p19"/>
+          <p:cNvPr id="127" name="Google Shape;127;p20"/>
           <p:cNvPicPr preferRelativeResize="0"/>
           <p:nvPr/>
         </p:nvPicPr>
@@ -11132,8 +12847,8 @@
         </p:blipFill>
         <p:spPr>
           <a:xfrm>
-            <a:off x="387650" y="1490400"/>
-            <a:ext cx="3552641" cy="3227100"/>
+            <a:off x="4475716" y="1490400"/>
+            <a:ext cx="3741360" cy="3227100"/>
           </a:xfrm>
           <a:prstGeom prst="rect">
             <a:avLst/>
@@ -11146,7 +12861,7 @@
       </p:pic>
       <p:pic>
         <p:nvPicPr>
-          <p:cNvPr id="118" name="Google Shape;118;p19"/>
+          <p:cNvPr id="128" name="Google Shape;128;p20"/>
           <p:cNvPicPr preferRelativeResize="0"/>
           <p:nvPr/>
         </p:nvPicPr>
@@ -11160,8 +12875,8 @@
         </p:blipFill>
         <p:spPr>
           <a:xfrm>
-            <a:off x="4475716" y="1490400"/>
-            <a:ext cx="3741360" cy="3227100"/>
+            <a:off x="626375" y="1490400"/>
+            <a:ext cx="3552641" cy="3227100"/>
           </a:xfrm>
           <a:prstGeom prst="rect">
             <a:avLst/>
@@ -11180,12 +12895,12 @@
 </p:sld>
 </file>
 
-<file path=ppt/slides/slide8.xml><?xml version="1.0" encoding="utf-8"?>
+<file path=ppt/slides/slide9.xml><?xml version="1.0" encoding="utf-8"?>
 <p:sld xmlns:a="http://schemas.openxmlformats.org/drawingml/2006/main" xmlns:r="http://schemas.openxmlformats.org/officeDocument/2006/relationships" xmlns:mc="http://schemas.openxmlformats.org/markup-compatibility/2006" xmlns:mv="urn:schemas-microsoft-com:mac:vml" xmlns:p="http://schemas.openxmlformats.org/presentationml/2006/main" xmlns:c="http://schemas.openxmlformats.org/drawingml/2006/chart" xmlns:dgm="http://schemas.openxmlformats.org/drawingml/2006/diagram" xmlns:o="urn:schemas-microsoft-com:office:office" xmlns:v="urn:schemas-microsoft-com:vml" xmlns:pvml="urn:schemas-microsoft-com:office:powerpoint" xmlns:com="http://schemas.openxmlformats.org/drawingml/2006/compatibility" xmlns:p14="http://schemas.microsoft.com/office/powerpoint/2010/main" xmlns:p15="http://schemas.microsoft.com/office/powerpoint/2012/main" xmlns:ahyp="http://schemas.microsoft.com/office/drawing/2018/hyperlinkcolor">
   <p:cSld>
     <p:spTree>
       <p:nvGrpSpPr>
-        <p:cNvPr id="122" name="Shape 122"/>
+        <p:cNvPr id="132" name="Shape 132"/>
         <p:cNvGrpSpPr/>
         <p:nvPr/>
       </p:nvGrpSpPr>
@@ -11199,7 +12914,7 @@
       </p:grpSpPr>
       <p:pic>
         <p:nvPicPr>
-          <p:cNvPr id="123" name="Google Shape;123;p20"/>
+          <p:cNvPr id="133" name="Google Shape;133;p21"/>
           <p:cNvPicPr preferRelativeResize="0"/>
           <p:nvPr/>
         </p:nvPicPr>
@@ -11227,7 +12942,7 @@
       </p:pic>
       <p:pic>
         <p:nvPicPr>
-          <p:cNvPr id="124" name="Google Shape;124;p20"/>
+          <p:cNvPr id="134" name="Google Shape;134;p21"/>
           <p:cNvPicPr preferRelativeResize="0"/>
           <p:nvPr/>
         </p:nvPicPr>
@@ -11255,7 +12970,7 @@
       </p:pic>
       <p:sp>
         <p:nvSpPr>
-          <p:cNvPr id="125" name="Google Shape;125;p20"/>
+          <p:cNvPr id="135" name="Google Shape;135;p21"/>
           <p:cNvSpPr txBox="1"/>
           <p:nvPr>
             <p:ph type="title"/>
@@ -11321,1290 +13036,286 @@
 </p:sld>
 </file>
 
-<file path=ppt/slides/slide9.xml><?xml version="1.0" encoding="utf-8"?>
-<p:sld xmlns:a="http://schemas.openxmlformats.org/drawingml/2006/main" xmlns:r="http://schemas.openxmlformats.org/officeDocument/2006/relationships" xmlns:mc="http://schemas.openxmlformats.org/markup-compatibility/2006" xmlns:mv="urn:schemas-microsoft-com:mac:vml" xmlns:p="http://schemas.openxmlformats.org/presentationml/2006/main" xmlns:c="http://schemas.openxmlformats.org/drawingml/2006/chart" xmlns:dgm="http://schemas.openxmlformats.org/drawingml/2006/diagram" xmlns:o="urn:schemas-microsoft-com:office:office" xmlns:v="urn:schemas-microsoft-com:vml" xmlns:pvml="urn:schemas-microsoft-com:office:powerpoint" xmlns:com="http://schemas.openxmlformats.org/drawingml/2006/compatibility" xmlns:p14="http://schemas.microsoft.com/office/powerpoint/2010/main" xmlns:p15="http://schemas.microsoft.com/office/powerpoint/2012/main" xmlns:ahyp="http://schemas.microsoft.com/office/drawing/2018/hyperlinkcolor">
-  <p:cSld>
-    <p:bg>
-      <p:bgPr>
+<file path=ppt/theme/theme1.xml><?xml version="1.0" encoding="utf-8"?>
+<a:theme xmlns:a="http://schemas.openxmlformats.org/drawingml/2006/main" xmlns:r="http://schemas.openxmlformats.org/officeDocument/2006/relationships" name="Spearmint">
+  <a:themeElements>
+    <a:clrScheme name="Spearmint">
+      <a:dk1>
+        <a:srgbClr val="202729"/>
+      </a:dk1>
+      <a:lt1>
+        <a:srgbClr val="FFFFFF"/>
+      </a:lt1>
+      <a:dk2>
+        <a:srgbClr val="4BA173"/>
+      </a:dk2>
+      <a:lt2>
+        <a:srgbClr val="63D297"/>
+      </a:lt2>
+      <a:accent1>
+        <a:srgbClr val="353744"/>
+      </a:accent1>
+      <a:accent2>
+        <a:srgbClr val="424242"/>
+      </a:accent2>
+      <a:accent3>
+        <a:srgbClr val="616161"/>
+      </a:accent3>
+      <a:accent4>
+        <a:srgbClr val="999999"/>
+      </a:accent4>
+      <a:accent5>
+        <a:srgbClr val="FF5252"/>
+      </a:accent5>
+      <a:accent6>
+        <a:srgbClr val="FFF176"/>
+      </a:accent6>
+      <a:hlink>
+        <a:srgbClr val="FF5252"/>
+      </a:hlink>
+      <a:folHlink>
+        <a:srgbClr val="FF5252"/>
+      </a:folHlink>
+    </a:clrScheme>
+    <a:fontScheme name="Office">
+      <a:majorFont>
+        <a:latin typeface="Arial"/>
+        <a:ea typeface=""/>
+        <a:cs typeface=""/>
+        <a:font script="Jpan" typeface="ＭＳ Ｐゴシック"/>
+        <a:font script="Hang" typeface="맑은 고딕"/>
+        <a:font script="Hans" typeface="宋体"/>
+        <a:font script="Hant" typeface="新細明體"/>
+        <a:font script="Arab" typeface="Times New Roman"/>
+        <a:font script="Hebr" typeface="Times New Roman"/>
+        <a:font script="Thai" typeface="Angsana New"/>
+        <a:font script="Ethi" typeface="Nyala"/>
+        <a:font script="Beng" typeface="Vrinda"/>
+        <a:font script="Gujr" typeface="Shruti"/>
+        <a:font script="Khmr" typeface="MoolBoran"/>
+        <a:font script="Knda" typeface="Tunga"/>
+        <a:font script="Guru" typeface="Raavi"/>
+        <a:font script="Cans" typeface="Euphemia"/>
+        <a:font script="Cher" typeface="Plantagenet Cherokee"/>
+        <a:font script="Yiii" typeface="Microsoft Yi Baiti"/>
+        <a:font script="Tibt" typeface="Microsoft Himalaya"/>
+        <a:font script="Thaa" typeface="MV Boli"/>
+        <a:font script="Deva" typeface="Mangal"/>
+        <a:font script="Telu" typeface="Gautami"/>
+        <a:font script="Taml" typeface="Latha"/>
+        <a:font script="Syrc" typeface="Estrangelo Edessa"/>
+        <a:font script="Orya" typeface="Kalinga"/>
+        <a:font script="Mlym" typeface="Kartika"/>
+        <a:font script="Laoo" typeface="DokChampa"/>
+        <a:font script="Sinh" typeface="Iskoola Pota"/>
+        <a:font script="Mong" typeface="Mongolian Baiti"/>
+        <a:font script="Viet" typeface="Times New Roman"/>
+        <a:font script="Uigh" typeface="Microsoft Uighur"/>
+        <a:font script="Geor" typeface="Sylfaen"/>
+      </a:majorFont>
+      <a:minorFont>
+        <a:latin typeface="Arial"/>
+        <a:ea typeface=""/>
+        <a:cs typeface=""/>
+        <a:font script="Jpan" typeface="ＭＳ Ｐゴシック"/>
+        <a:font script="Hang" typeface="맑은 고딕"/>
+        <a:font script="Hans" typeface="宋体"/>
+        <a:font script="Hant" typeface="新細明體"/>
+        <a:font script="Arab" typeface="Arial"/>
+        <a:font script="Hebr" typeface="Arial"/>
+        <a:font script="Thai" typeface="Cordia New"/>
+        <a:font script="Ethi" typeface="Nyala"/>
+        <a:font script="Beng" typeface="Vrinda"/>
+        <a:font script="Gujr" typeface="Shruti"/>
+        <a:font script="Khmr" typeface="DaunPenh"/>
+        <a:font script="Knda" typeface="Tunga"/>
+        <a:font script="Guru" typeface="Raavi"/>
+        <a:font script="Cans" typeface="Euphemia"/>
+        <a:font script="Cher" typeface="Plantagenet Cherokee"/>
+        <a:font script="Yiii" typeface="Microsoft Yi Baiti"/>
+        <a:font script="Tibt" typeface="Microsoft Himalaya"/>
+        <a:font script="Thaa" typeface="MV Boli"/>
+        <a:font script="Deva" typeface="Mangal"/>
+        <a:font script="Telu" typeface="Gautami"/>
+        <a:font script="Taml" typeface="Latha"/>
+        <a:font script="Syrc" typeface="Estrangelo Edessa"/>
+        <a:font script="Orya" typeface="Kalinga"/>
+        <a:font script="Mlym" typeface="Kartika"/>
+        <a:font script="Laoo" typeface="DokChampa"/>
+        <a:font script="Sinh" typeface="Iskoola Pota"/>
+        <a:font script="Mong" typeface="Mongolian Baiti"/>
+        <a:font script="Viet" typeface="Arial"/>
+        <a:font script="Uigh" typeface="Microsoft Uighur"/>
+        <a:font script="Geor" typeface="Sylfaen"/>
+      </a:minorFont>
+    </a:fontScheme>
+    <a:fmtScheme name="Office">
+      <a:fillStyleLst>
         <a:solidFill>
-          <a:srgbClr val="000000"/>
+          <a:schemeClr val="phClr"/>
         </a:solidFill>
-      </p:bgPr>
-    </p:bg>
-    <p:spTree>
-      <p:nvGrpSpPr>
-        <p:cNvPr id="129" name="Shape 129"/>
-        <p:cNvGrpSpPr/>
-        <p:nvPr/>
-      </p:nvGrpSpPr>
-      <p:grpSpPr>
-        <a:xfrm>
-          <a:off x="0" y="0"/>
-          <a:ext cx="0" cy="0"/>
-          <a:chOff x="0" y="0"/>
-          <a:chExt cx="0" cy="0"/>
-        </a:xfrm>
-      </p:grpSpPr>
-      <p:grpSp>
-        <p:nvGrpSpPr>
-          <p:cNvPr id="130" name="Google Shape;130;p21"/>
-          <p:cNvGrpSpPr/>
-          <p:nvPr/>
-        </p:nvGrpSpPr>
-        <p:grpSpPr>
-          <a:xfrm>
-            <a:off x="2955078" y="1823523"/>
-            <a:ext cx="1101051" cy="1229192"/>
-            <a:chOff x="1072938" y="238145"/>
-            <a:chExt cx="1440600" cy="1655700"/>
-          </a:xfrm>
-        </p:grpSpPr>
-        <p:sp>
-          <p:nvSpPr>
-            <p:cNvPr id="131" name="Google Shape;131;p21"/>
-            <p:cNvSpPr/>
-            <p:nvPr/>
-          </p:nvSpPr>
-          <p:spPr>
-            <a:xfrm rot="5400000">
-              <a:off x="965388" y="345695"/>
-              <a:ext cx="1655700" cy="1440600"/>
-            </a:xfrm>
-            <a:prstGeom prst="hexagon">
-              <a:avLst>
-                <a:gd fmla="val 25000" name="adj"/>
-                <a:gd fmla="val 115470" name="vf"/>
-              </a:avLst>
-            </a:prstGeom>
-            <a:solidFill>
-              <a:srgbClr val="8BC34A"/>
-            </a:solidFill>
-            <a:ln cap="flat" cmpd="sng" w="15875">
-              <a:solidFill>
-                <a:srgbClr val="FFFFFF"/>
-              </a:solidFill>
-              <a:prstDash val="solid"/>
-              <a:round/>
-              <a:headEnd len="sm" w="sm" type="none"/>
-              <a:tailEnd len="sm" w="sm" type="none"/>
-            </a:ln>
-          </p:spPr>
-          <p:txBody>
-            <a:bodyPr anchorCtr="0" anchor="ctr" bIns="68575" lIns="68575" spcFirstLastPara="1" rIns="68575" wrap="square" tIns="68575">
-              <a:noAutofit/>
-            </a:bodyPr>
-            <a:lstStyle/>
-            <a:p>
-              <a:pPr indent="0" lvl="0" marL="0" rtl="0" algn="l">
-                <a:spcBef>
-                  <a:spcPts val="0"/>
-                </a:spcBef>
-                <a:spcAft>
-                  <a:spcPts val="0"/>
-                </a:spcAft>
-                <a:buNone/>
-              </a:pPr>
-              <a:r>
-                <a:t/>
-              </a:r>
-              <a:endParaRPr/>
-            </a:p>
-          </p:txBody>
-        </p:sp>
-        <p:sp>
-          <p:nvSpPr>
-            <p:cNvPr id="132" name="Google Shape;132;p21"/>
-            <p:cNvSpPr txBox="1"/>
-            <p:nvPr/>
-          </p:nvSpPr>
-          <p:spPr>
-            <a:xfrm>
-              <a:off x="1297460" y="739071"/>
-              <a:ext cx="991500" cy="897000"/>
-            </a:xfrm>
-            <a:prstGeom prst="rect">
-              <a:avLst/>
-            </a:prstGeom>
-            <a:solidFill>
-              <a:srgbClr val="8BC34A"/>
-            </a:solidFill>
-            <a:ln>
-              <a:noFill/>
-            </a:ln>
-          </p:spPr>
-          <p:txBody>
-            <a:bodyPr anchorCtr="0" anchor="ctr" bIns="0" lIns="0" spcFirstLastPara="1" rIns="0" wrap="square" tIns="0">
-              <a:noAutofit/>
-            </a:bodyPr>
-            <a:lstStyle/>
-            <a:p>
-              <a:pPr indent="0" lvl="0" marL="0" rtl="0" algn="ctr">
-                <a:lnSpc>
-                  <a:spcPct val="90000"/>
-                </a:lnSpc>
-                <a:spcBef>
-                  <a:spcPts val="0"/>
-                </a:spcBef>
-                <a:spcAft>
-                  <a:spcPts val="0"/>
-                </a:spcAft>
-                <a:buClr>
-                  <a:srgbClr val="000000"/>
-                </a:buClr>
-                <a:buSzPts val="1200"/>
-                <a:buFont typeface="Arial"/>
-                <a:buNone/>
-              </a:pPr>
-              <a:r>
-                <a:rPr lang="en" sz="1200"/>
-                <a:t>EffNetB6</a:t>
-              </a:r>
-              <a:endParaRPr sz="1300"/>
-            </a:p>
-          </p:txBody>
-        </p:sp>
-      </p:grpSp>
-      <p:sp>
-        <p:nvSpPr>
-          <p:cNvPr id="133" name="Google Shape;133;p21"/>
-          <p:cNvSpPr txBox="1"/>
-          <p:nvPr/>
-        </p:nvSpPr>
-        <p:spPr>
-          <a:xfrm>
-            <a:off x="1951550" y="548350"/>
-            <a:ext cx="208500" cy="33000"/>
-          </a:xfrm>
-          <a:prstGeom prst="rect">
-            <a:avLst/>
-          </a:prstGeom>
-          <a:noFill/>
-          <a:ln>
-            <a:noFill/>
-          </a:ln>
-        </p:spPr>
-        <p:txBody>
-          <a:bodyPr anchorCtr="0" anchor="t" bIns="91425" lIns="91425" spcFirstLastPara="1" rIns="91425" wrap="square" tIns="91425">
-            <a:noAutofit/>
-          </a:bodyPr>
-          <a:lstStyle/>
-          <a:p>
-            <a:pPr indent="0" lvl="0" marL="0" rtl="0" algn="l">
-              <a:spcBef>
-                <a:spcPts val="0"/>
-              </a:spcBef>
-              <a:spcAft>
-                <a:spcPts val="0"/>
-              </a:spcAft>
-              <a:buNone/>
-            </a:pPr>
-            <a:r>
-              <a:t/>
-            </a:r>
-            <a:endParaRPr>
-              <a:latin typeface="Roboto"/>
-              <a:ea typeface="Roboto"/>
-              <a:cs typeface="Roboto"/>
-              <a:sym typeface="Roboto"/>
-            </a:endParaRPr>
-          </a:p>
-        </p:txBody>
-      </p:sp>
-      <p:sp>
-        <p:nvSpPr>
-          <p:cNvPr id="134" name="Google Shape;134;p21"/>
-          <p:cNvSpPr/>
-          <p:nvPr/>
-        </p:nvSpPr>
-        <p:spPr>
-          <a:xfrm rot="5400000">
-            <a:off x="1115075" y="2979050"/>
-            <a:ext cx="1294200" cy="1058700"/>
-          </a:xfrm>
-          <a:prstGeom prst="hexagon">
-            <a:avLst>
-              <a:gd fmla="val 25000" name="adj"/>
-              <a:gd fmla="val 115470" name="vf"/>
-            </a:avLst>
-          </a:prstGeom>
+        <a:gradFill rotWithShape="1">
+          <a:gsLst>
+            <a:gs pos="0">
+              <a:schemeClr val="phClr">
+                <a:tint val="50000"/>
+                <a:satMod val="300000"/>
+              </a:schemeClr>
+            </a:gs>
+            <a:gs pos="35000">
+              <a:schemeClr val="phClr">
+                <a:tint val="37000"/>
+                <a:satMod val="300000"/>
+              </a:schemeClr>
+            </a:gs>
+            <a:gs pos="100000">
+              <a:schemeClr val="phClr">
+                <a:tint val="15000"/>
+                <a:satMod val="350000"/>
+              </a:schemeClr>
+            </a:gs>
+          </a:gsLst>
+          <a:lin ang="16200000" scaled="1"/>
+        </a:gradFill>
+        <a:gradFill rotWithShape="1">
+          <a:gsLst>
+            <a:gs pos="0">
+              <a:schemeClr val="phClr">
+                <a:tint val="100000"/>
+                <a:shade val="100000"/>
+                <a:satMod val="130000"/>
+              </a:schemeClr>
+            </a:gs>
+            <a:gs pos="100000">
+              <a:schemeClr val="phClr">
+                <a:tint val="50000"/>
+                <a:shade val="100000"/>
+                <a:satMod val="350000"/>
+              </a:schemeClr>
+            </a:gs>
+          </a:gsLst>
+          <a:lin ang="16200000" scaled="0"/>
+        </a:gradFill>
+      </a:fillStyleLst>
+      <a:lnStyleLst>
+        <a:ln w="9525" cap="flat" cmpd="sng" algn="ctr">
           <a:solidFill>
-            <a:srgbClr val="8BC34A"/>
+            <a:schemeClr val="phClr">
+              <a:shade val="95000"/>
+              <a:satMod val="105000"/>
+            </a:schemeClr>
           </a:solidFill>
-          <a:ln cap="flat" cmpd="sng" w="15875">
-            <a:solidFill>
-              <a:srgbClr val="FFFFFF"/>
-            </a:solidFill>
-            <a:prstDash val="solid"/>
-            <a:round/>
-            <a:headEnd len="sm" w="sm" type="none"/>
-            <a:tailEnd len="sm" w="sm" type="none"/>
-          </a:ln>
-        </p:spPr>
-        <p:txBody>
-          <a:bodyPr anchorCtr="0" anchor="ctr" bIns="68575" lIns="68575" spcFirstLastPara="1" rIns="68575" wrap="square" tIns="68575">
-            <a:noAutofit/>
-          </a:bodyPr>
-          <a:lstStyle/>
-          <a:p>
-            <a:pPr indent="0" lvl="0" marL="0" rtl="0" algn="l">
-              <a:spcBef>
-                <a:spcPts val="0"/>
-              </a:spcBef>
-              <a:spcAft>
-                <a:spcPts val="0"/>
-              </a:spcAft>
-              <a:buNone/>
-            </a:pPr>
-            <a:r>
-              <a:t/>
-            </a:r>
-            <a:endParaRPr/>
-          </a:p>
-        </p:txBody>
-      </p:sp>
-      <p:sp>
-        <p:nvSpPr>
-          <p:cNvPr id="135" name="Google Shape;135;p21"/>
-          <p:cNvSpPr txBox="1"/>
-          <p:nvPr/>
-        </p:nvSpPr>
-        <p:spPr>
-          <a:xfrm>
-            <a:off x="1388232" y="3113096"/>
-            <a:ext cx="747900" cy="884400"/>
-          </a:xfrm>
-          <a:prstGeom prst="rect">
-            <a:avLst/>
-          </a:prstGeom>
-          <a:noFill/>
-          <a:ln>
-            <a:noFill/>
-          </a:ln>
-        </p:spPr>
-        <p:txBody>
-          <a:bodyPr anchorCtr="0" anchor="ctr" bIns="45725" lIns="45725" spcFirstLastPara="1" rIns="45725" wrap="square" tIns="45725">
-            <a:noAutofit/>
-          </a:bodyPr>
-          <a:lstStyle/>
-          <a:p>
-            <a:pPr indent="0" lvl="0" marL="0" marR="0" rtl="0" algn="ctr">
-              <a:lnSpc>
-                <a:spcPct val="90000"/>
-              </a:lnSpc>
-              <a:spcBef>
-                <a:spcPts val="400"/>
-              </a:spcBef>
-              <a:spcAft>
-                <a:spcPts val="0"/>
-              </a:spcAft>
-              <a:buClr>
-                <a:srgbClr val="000000"/>
-              </a:buClr>
-              <a:buSzPts val="1200"/>
-              <a:buFont typeface="Arial"/>
-              <a:buNone/>
-            </a:pPr>
-            <a:r>
-              <a:rPr lang="en" sz="1200"/>
-              <a:t>Resnet152</a:t>
-            </a:r>
-            <a:endParaRPr sz="1100"/>
-          </a:p>
-        </p:txBody>
-      </p:sp>
-      <p:sp>
-        <p:nvSpPr>
-          <p:cNvPr id="136" name="Google Shape;136;p21"/>
-          <p:cNvSpPr txBox="1"/>
-          <p:nvPr/>
-        </p:nvSpPr>
-        <p:spPr>
-          <a:xfrm>
-            <a:off x="811382" y="4084971"/>
-            <a:ext cx="747900" cy="884400"/>
-          </a:xfrm>
-          <a:prstGeom prst="rect">
-            <a:avLst/>
-          </a:prstGeom>
-          <a:noFill/>
-          <a:ln>
-            <a:noFill/>
-          </a:ln>
-        </p:spPr>
-        <p:txBody>
-          <a:bodyPr anchorCtr="0" anchor="ctr" bIns="45725" lIns="45725" spcFirstLastPara="1" rIns="45725" wrap="square" tIns="45725">
-            <a:noAutofit/>
-          </a:bodyPr>
-          <a:lstStyle/>
-          <a:p>
-            <a:pPr indent="0" lvl="0" marL="0" marR="0" rtl="0" algn="ctr">
-              <a:lnSpc>
-                <a:spcPct val="90000"/>
-              </a:lnSpc>
-              <a:spcBef>
-                <a:spcPts val="400"/>
-              </a:spcBef>
-              <a:spcAft>
-                <a:spcPts val="0"/>
-              </a:spcAft>
-              <a:buClr>
-                <a:srgbClr val="000000"/>
-              </a:buClr>
-              <a:buSzPts val="1200"/>
-              <a:buFont typeface="Arial"/>
-              <a:buNone/>
-            </a:pPr>
-            <a:r>
-              <a:rPr lang="en" sz="1200"/>
-              <a:t>SVM</a:t>
-            </a:r>
-            <a:endParaRPr sz="1100"/>
-          </a:p>
-        </p:txBody>
-      </p:sp>
-      <p:sp>
-        <p:nvSpPr>
-          <p:cNvPr id="137" name="Google Shape;137;p21"/>
-          <p:cNvSpPr txBox="1"/>
-          <p:nvPr/>
-        </p:nvSpPr>
-        <p:spPr>
-          <a:xfrm>
-            <a:off x="3152795" y="4150771"/>
-            <a:ext cx="747900" cy="884400"/>
-          </a:xfrm>
-          <a:prstGeom prst="rect">
-            <a:avLst/>
-          </a:prstGeom>
-          <a:noFill/>
-          <a:ln>
-            <a:noFill/>
-          </a:ln>
-        </p:spPr>
-        <p:txBody>
-          <a:bodyPr anchorCtr="0" anchor="ctr" bIns="45725" lIns="45725" spcFirstLastPara="1" rIns="45725" wrap="square" tIns="45725">
-            <a:noAutofit/>
-          </a:bodyPr>
-          <a:lstStyle/>
-          <a:p>
-            <a:pPr indent="0" lvl="0" marL="0" marR="0" rtl="0" algn="ctr">
-              <a:lnSpc>
-                <a:spcPct val="90000"/>
-              </a:lnSpc>
-              <a:spcBef>
-                <a:spcPts val="400"/>
-              </a:spcBef>
-              <a:spcAft>
-                <a:spcPts val="0"/>
-              </a:spcAft>
-              <a:buClr>
-                <a:srgbClr val="000000"/>
-              </a:buClr>
-              <a:buSzPts val="1200"/>
-              <a:buFont typeface="Arial"/>
-              <a:buNone/>
-            </a:pPr>
-            <a:r>
-              <a:rPr lang="en" sz="1200"/>
-              <a:t>ML NN</a:t>
-            </a:r>
-            <a:endParaRPr sz="1100"/>
-          </a:p>
-        </p:txBody>
-      </p:sp>
-      <p:sp>
-        <p:nvSpPr>
-          <p:cNvPr id="138" name="Google Shape;138;p21"/>
-          <p:cNvSpPr txBox="1"/>
-          <p:nvPr/>
-        </p:nvSpPr>
-        <p:spPr>
-          <a:xfrm>
-            <a:off x="3152795" y="4150771"/>
-            <a:ext cx="747900" cy="884400"/>
-          </a:xfrm>
-          <a:prstGeom prst="rect">
-            <a:avLst/>
-          </a:prstGeom>
-          <a:noFill/>
-          <a:ln>
-            <a:noFill/>
-          </a:ln>
-        </p:spPr>
-        <p:txBody>
-          <a:bodyPr anchorCtr="0" anchor="ctr" bIns="45725" lIns="45725" spcFirstLastPara="1" rIns="45725" wrap="square" tIns="45725">
-            <a:noAutofit/>
-          </a:bodyPr>
-          <a:lstStyle/>
-          <a:p>
-            <a:pPr indent="0" lvl="0" marL="0" marR="0" rtl="0" algn="ctr">
-              <a:lnSpc>
-                <a:spcPct val="90000"/>
-              </a:lnSpc>
-              <a:spcBef>
-                <a:spcPts val="400"/>
-              </a:spcBef>
-              <a:spcAft>
-                <a:spcPts val="0"/>
-              </a:spcAft>
-              <a:buClr>
-                <a:srgbClr val="000000"/>
-              </a:buClr>
-              <a:buSzPts val="1200"/>
-              <a:buFont typeface="Arial"/>
-              <a:buNone/>
-            </a:pPr>
-            <a:r>
-              <a:rPr lang="en" sz="1200"/>
-              <a:t>ML NN</a:t>
-            </a:r>
-            <a:endParaRPr sz="1100"/>
-          </a:p>
-        </p:txBody>
-      </p:sp>
-      <p:grpSp>
-        <p:nvGrpSpPr>
-          <p:cNvPr id="139" name="Google Shape;139;p21"/>
-          <p:cNvGrpSpPr/>
-          <p:nvPr/>
-        </p:nvGrpSpPr>
-        <p:grpSpPr>
-          <a:xfrm>
-            <a:off x="629956" y="1813145"/>
-            <a:ext cx="3666094" cy="2316101"/>
-            <a:chOff x="1072938" y="234651"/>
-            <a:chExt cx="4888125" cy="3088135"/>
-          </a:xfrm>
-        </p:grpSpPr>
-        <p:sp>
-          <p:nvSpPr>
-            <p:cNvPr id="140" name="Google Shape;140;p21"/>
-            <p:cNvSpPr/>
-            <p:nvPr/>
-          </p:nvSpPr>
-          <p:spPr>
-            <a:xfrm rot="5400000">
-              <a:off x="2509632" y="342201"/>
-              <a:ext cx="1655700" cy="1440600"/>
-            </a:xfrm>
-            <a:prstGeom prst="hexagon">
-              <a:avLst>
-                <a:gd fmla="val 25000" name="adj"/>
-                <a:gd fmla="val 115470" name="vf"/>
-              </a:avLst>
-            </a:prstGeom>
-            <a:solidFill>
-              <a:srgbClr val="FFFF00"/>
-            </a:solidFill>
-            <a:ln cap="flat" cmpd="sng" w="15875">
-              <a:solidFill>
-                <a:srgbClr val="FFFFFF"/>
-              </a:solidFill>
-              <a:prstDash val="solid"/>
-              <a:round/>
-              <a:headEnd len="sm" w="sm" type="none"/>
-              <a:tailEnd len="sm" w="sm" type="none"/>
-            </a:ln>
-          </p:spPr>
-          <p:txBody>
-            <a:bodyPr anchorCtr="0" anchor="ctr" bIns="68575" lIns="68575" spcFirstLastPara="1" rIns="68575" wrap="square" tIns="68575">
-              <a:noAutofit/>
-            </a:bodyPr>
-            <a:lstStyle/>
-            <a:p>
-              <a:pPr indent="0" lvl="0" marL="0" rtl="0" algn="l">
-                <a:spcBef>
-                  <a:spcPts val="0"/>
-                </a:spcBef>
-                <a:spcAft>
-                  <a:spcPts val="0"/>
-                </a:spcAft>
-                <a:buNone/>
-              </a:pPr>
-              <a:r>
-                <a:t/>
-              </a:r>
-              <a:endParaRPr/>
-            </a:p>
-          </p:txBody>
-        </p:sp>
-        <p:sp>
-          <p:nvSpPr>
-            <p:cNvPr id="141" name="Google Shape;141;p21"/>
-            <p:cNvSpPr txBox="1"/>
-            <p:nvPr/>
-          </p:nvSpPr>
-          <p:spPr>
-            <a:xfrm>
-              <a:off x="2841704" y="492684"/>
-              <a:ext cx="991500" cy="1139700"/>
-            </a:xfrm>
-            <a:prstGeom prst="rect">
-              <a:avLst/>
-            </a:prstGeom>
-            <a:noFill/>
-            <a:ln>
-              <a:noFill/>
-            </a:ln>
-          </p:spPr>
-          <p:txBody>
-            <a:bodyPr anchorCtr="0" anchor="ctr" bIns="45725" lIns="45725" spcFirstLastPara="1" rIns="45725" wrap="square" tIns="45725">
-              <a:noAutofit/>
-            </a:bodyPr>
-            <a:lstStyle/>
-            <a:p>
-              <a:pPr indent="0" lvl="0" marL="0" rtl="0" algn="ctr">
-                <a:lnSpc>
-                  <a:spcPct val="90000"/>
-                </a:lnSpc>
-                <a:spcBef>
-                  <a:spcPts val="0"/>
-                </a:spcBef>
-                <a:spcAft>
-                  <a:spcPts val="0"/>
-                </a:spcAft>
-                <a:buClr>
-                  <a:srgbClr val="000000"/>
-                </a:buClr>
-                <a:buSzPts val="1200"/>
-                <a:buFont typeface="Arial"/>
-                <a:buNone/>
-              </a:pPr>
-              <a:r>
-                <a:rPr lang="en" sz="1200"/>
-                <a:t>EffNetB5</a:t>
-              </a:r>
-              <a:endParaRPr sz="1200"/>
-            </a:p>
-          </p:txBody>
-        </p:sp>
-        <p:sp>
-          <p:nvSpPr>
-            <p:cNvPr id="142" name="Google Shape;142;p21"/>
-            <p:cNvSpPr/>
-            <p:nvPr/>
-          </p:nvSpPr>
-          <p:spPr>
-            <a:xfrm>
-              <a:off x="4113063" y="569309"/>
-              <a:ext cx="1848000" cy="993600"/>
-            </a:xfrm>
-            <a:prstGeom prst="rect">
-              <a:avLst/>
-            </a:prstGeom>
-            <a:noFill/>
-            <a:ln>
-              <a:noFill/>
-            </a:ln>
-          </p:spPr>
-          <p:txBody>
-            <a:bodyPr anchorCtr="0" anchor="ctr" bIns="68575" lIns="68575" spcFirstLastPara="1" rIns="68575" wrap="square" tIns="68575">
-              <a:noAutofit/>
-            </a:bodyPr>
-            <a:lstStyle/>
-            <a:p>
-              <a:pPr indent="0" lvl="0" marL="0" rtl="0" algn="l">
-                <a:spcBef>
-                  <a:spcPts val="0"/>
-                </a:spcBef>
-                <a:spcAft>
-                  <a:spcPts val="0"/>
-                </a:spcAft>
-                <a:buNone/>
-              </a:pPr>
-              <a:r>
-                <a:t/>
-              </a:r>
-              <a:endParaRPr/>
-            </a:p>
-          </p:txBody>
-        </p:sp>
-        <p:sp>
-          <p:nvSpPr>
-            <p:cNvPr id="143" name="Google Shape;143;p21"/>
-            <p:cNvSpPr/>
-            <p:nvPr/>
-          </p:nvSpPr>
-          <p:spPr>
-            <a:xfrm rot="5400000">
-              <a:off x="965388" y="345695"/>
-              <a:ext cx="1655700" cy="1440600"/>
-            </a:xfrm>
-            <a:prstGeom prst="hexagon">
-              <a:avLst>
-                <a:gd fmla="val 25000" name="adj"/>
-                <a:gd fmla="val 115470" name="vf"/>
-              </a:avLst>
-            </a:prstGeom>
-            <a:solidFill>
-              <a:srgbClr val="FFFF00"/>
-            </a:solidFill>
-            <a:ln cap="flat" cmpd="sng" w="15875">
-              <a:solidFill>
-                <a:srgbClr val="FFFFFF"/>
-              </a:solidFill>
-              <a:prstDash val="solid"/>
-              <a:round/>
-              <a:headEnd len="sm" w="sm" type="none"/>
-              <a:tailEnd len="sm" w="sm" type="none"/>
-            </a:ln>
-          </p:spPr>
-          <p:txBody>
-            <a:bodyPr anchorCtr="0" anchor="ctr" bIns="68575" lIns="68575" spcFirstLastPara="1" rIns="68575" wrap="square" tIns="68575">
-              <a:noAutofit/>
-            </a:bodyPr>
-            <a:lstStyle/>
-            <a:p>
-              <a:pPr indent="0" lvl="0" marL="0" rtl="0" algn="l">
-                <a:spcBef>
-                  <a:spcPts val="0"/>
-                </a:spcBef>
-                <a:spcAft>
-                  <a:spcPts val="0"/>
-                </a:spcAft>
-                <a:buNone/>
-              </a:pPr>
-              <a:r>
-                <a:t/>
-              </a:r>
-              <a:endParaRPr/>
-            </a:p>
-          </p:txBody>
-        </p:sp>
-        <p:sp>
-          <p:nvSpPr>
-            <p:cNvPr id="144" name="Google Shape;144;p21"/>
-            <p:cNvSpPr txBox="1"/>
-            <p:nvPr/>
-          </p:nvSpPr>
-          <p:spPr>
-            <a:xfrm>
-              <a:off x="1297460" y="496177"/>
-              <a:ext cx="991500" cy="1139700"/>
-            </a:xfrm>
-            <a:prstGeom prst="rect">
-              <a:avLst/>
-            </a:prstGeom>
-            <a:noFill/>
-            <a:ln>
-              <a:noFill/>
-            </a:ln>
-          </p:spPr>
-          <p:txBody>
-            <a:bodyPr anchorCtr="0" anchor="ctr" bIns="0" lIns="0" spcFirstLastPara="1" rIns="0" wrap="square" tIns="0">
-              <a:noAutofit/>
-            </a:bodyPr>
-            <a:lstStyle/>
-            <a:p>
-              <a:pPr indent="0" lvl="0" marL="0" marR="0" rtl="0" algn="ctr">
-                <a:lnSpc>
-                  <a:spcPct val="90000"/>
-                </a:lnSpc>
-                <a:spcBef>
-                  <a:spcPts val="0"/>
-                </a:spcBef>
-                <a:spcAft>
-                  <a:spcPts val="0"/>
-                </a:spcAft>
-                <a:buClr>
-                  <a:srgbClr val="000000"/>
-                </a:buClr>
-                <a:buSzPts val="1200"/>
-                <a:buFont typeface="Arial"/>
-                <a:buNone/>
-              </a:pPr>
-              <a:r>
-                <a:rPr lang="en" sz="1200"/>
-                <a:t>EffNetB3</a:t>
-              </a:r>
-              <a:endParaRPr sz="1100"/>
-            </a:p>
-          </p:txBody>
-        </p:sp>
-        <p:sp>
-          <p:nvSpPr>
-            <p:cNvPr id="145" name="Google Shape;145;p21"/>
-            <p:cNvSpPr/>
-            <p:nvPr/>
-          </p:nvSpPr>
-          <p:spPr>
-            <a:xfrm>
-              <a:off x="1696750" y="1996884"/>
-              <a:ext cx="1788300" cy="993600"/>
-            </a:xfrm>
-            <a:prstGeom prst="rect">
-              <a:avLst/>
-            </a:prstGeom>
-            <a:noFill/>
-            <a:ln>
-              <a:noFill/>
-            </a:ln>
-          </p:spPr>
-          <p:txBody>
-            <a:bodyPr anchorCtr="0" anchor="ctr" bIns="68575" lIns="68575" spcFirstLastPara="1" rIns="68575" wrap="square" tIns="68575">
-              <a:noAutofit/>
-            </a:bodyPr>
-            <a:lstStyle/>
-            <a:p>
-              <a:pPr indent="0" lvl="0" marL="0" rtl="0" algn="l">
-                <a:spcBef>
-                  <a:spcPts val="0"/>
-                </a:spcBef>
-                <a:spcAft>
-                  <a:spcPts val="0"/>
-                </a:spcAft>
-                <a:buNone/>
-              </a:pPr>
-              <a:r>
-                <a:t/>
-              </a:r>
-              <a:endParaRPr sz="1200"/>
-            </a:p>
-          </p:txBody>
-        </p:sp>
-        <p:sp>
-          <p:nvSpPr>
-            <p:cNvPr id="146" name="Google Shape;146;p21"/>
-            <p:cNvSpPr/>
-            <p:nvPr/>
-          </p:nvSpPr>
-          <p:spPr>
-            <a:xfrm rot="5400000">
-              <a:off x="3296123" y="1774637"/>
-              <a:ext cx="1655700" cy="1440600"/>
-            </a:xfrm>
-            <a:prstGeom prst="hexagon">
-              <a:avLst>
-                <a:gd fmla="val 25000" name="adj"/>
-                <a:gd fmla="val 115470" name="vf"/>
-              </a:avLst>
-            </a:prstGeom>
-            <a:solidFill>
-              <a:srgbClr val="FFFF00"/>
-            </a:solidFill>
-            <a:ln cap="flat" cmpd="sng" w="15875">
-              <a:solidFill>
-                <a:srgbClr val="FFFFFF"/>
-              </a:solidFill>
-              <a:prstDash val="solid"/>
-              <a:round/>
-              <a:headEnd len="sm" w="sm" type="none"/>
-              <a:tailEnd len="sm" w="sm" type="none"/>
-            </a:ln>
-          </p:spPr>
-          <p:txBody>
-            <a:bodyPr anchorCtr="0" anchor="ctr" bIns="68575" lIns="68575" spcFirstLastPara="1" rIns="68575" wrap="square" tIns="68575">
-              <a:noAutofit/>
-            </a:bodyPr>
-            <a:lstStyle/>
-            <a:p>
-              <a:pPr indent="0" lvl="0" marL="0" rtl="0" algn="l">
-                <a:spcBef>
-                  <a:spcPts val="0"/>
-                </a:spcBef>
-                <a:spcAft>
-                  <a:spcPts val="0"/>
-                </a:spcAft>
-                <a:buNone/>
-              </a:pPr>
-              <a:r>
-                <a:t/>
-              </a:r>
-              <a:endParaRPr/>
-            </a:p>
-          </p:txBody>
-        </p:sp>
-        <p:sp>
-          <p:nvSpPr>
-            <p:cNvPr id="147" name="Google Shape;147;p21"/>
-            <p:cNvSpPr txBox="1"/>
-            <p:nvPr/>
-          </p:nvSpPr>
-          <p:spPr>
-            <a:xfrm>
-              <a:off x="3628196" y="1925119"/>
-              <a:ext cx="991500" cy="1139700"/>
-            </a:xfrm>
-            <a:prstGeom prst="rect">
-              <a:avLst/>
-            </a:prstGeom>
-            <a:noFill/>
-            <a:ln>
-              <a:noFill/>
-            </a:ln>
-          </p:spPr>
-          <p:txBody>
-            <a:bodyPr anchorCtr="0" anchor="ctr" bIns="0" lIns="0" spcFirstLastPara="1" rIns="0" wrap="square" tIns="0">
-              <a:noAutofit/>
-            </a:bodyPr>
-            <a:lstStyle/>
-            <a:p>
-              <a:pPr indent="0" lvl="0" marL="0" marR="0" rtl="0" algn="ctr">
-                <a:lnSpc>
-                  <a:spcPct val="90000"/>
-                </a:lnSpc>
-                <a:spcBef>
-                  <a:spcPts val="0"/>
-                </a:spcBef>
-                <a:spcAft>
-                  <a:spcPts val="0"/>
-                </a:spcAft>
-                <a:buClr>
-                  <a:srgbClr val="000000"/>
-                </a:buClr>
-                <a:buSzPts val="1500"/>
-                <a:buFont typeface="Arial"/>
-                <a:buNone/>
-              </a:pPr>
-              <a:r>
-                <a:rPr lang="en" sz="1300"/>
-                <a:t>Resnet50</a:t>
-              </a:r>
-              <a:endParaRPr sz="900"/>
-            </a:p>
-          </p:txBody>
-        </p:sp>
-      </p:grpSp>
-      <p:sp>
-        <p:nvSpPr>
-          <p:cNvPr id="148" name="Google Shape;148;p21"/>
-          <p:cNvSpPr txBox="1"/>
-          <p:nvPr/>
-        </p:nvSpPr>
-        <p:spPr>
-          <a:xfrm>
-            <a:off x="3686695" y="3036021"/>
-            <a:ext cx="747900" cy="884400"/>
-          </a:xfrm>
-          <a:prstGeom prst="rect">
-            <a:avLst/>
-          </a:prstGeom>
-          <a:noFill/>
-          <a:ln>
-            <a:noFill/>
-          </a:ln>
-        </p:spPr>
-        <p:txBody>
-          <a:bodyPr anchorCtr="0" anchor="ctr" bIns="45725" lIns="45725" spcFirstLastPara="1" rIns="45725" wrap="square" tIns="45725">
-            <a:noAutofit/>
-          </a:bodyPr>
-          <a:lstStyle/>
-          <a:p>
-            <a:pPr indent="0" lvl="0" marL="0" marR="0" rtl="0" algn="ctr">
-              <a:lnSpc>
-                <a:spcPct val="90000"/>
-              </a:lnSpc>
-              <a:spcBef>
-                <a:spcPts val="400"/>
-              </a:spcBef>
-              <a:spcAft>
-                <a:spcPts val="0"/>
-              </a:spcAft>
-              <a:buClr>
-                <a:srgbClr val="000000"/>
-              </a:buClr>
-              <a:buSzPts val="1200"/>
-              <a:buFont typeface="Arial"/>
-              <a:buNone/>
-            </a:pPr>
-            <a:r>
-              <a:rPr lang="en" sz="1200"/>
-              <a:t>Linear</a:t>
-            </a:r>
-            <a:endParaRPr sz="1100"/>
-          </a:p>
-        </p:txBody>
-      </p:sp>
-      <p:grpSp>
-        <p:nvGrpSpPr>
-          <p:cNvPr id="149" name="Google Shape;149;p21"/>
-          <p:cNvGrpSpPr/>
-          <p:nvPr/>
-        </p:nvGrpSpPr>
-        <p:grpSpPr>
-          <a:xfrm>
-            <a:off x="1211653" y="751398"/>
-            <a:ext cx="1101051" cy="1229192"/>
-            <a:chOff x="1072938" y="238145"/>
-            <a:chExt cx="1440600" cy="1655700"/>
-          </a:xfrm>
-        </p:grpSpPr>
-        <p:sp>
-          <p:nvSpPr>
-            <p:cNvPr id="150" name="Google Shape;150;p21"/>
-            <p:cNvSpPr/>
-            <p:nvPr/>
-          </p:nvSpPr>
-          <p:spPr>
-            <a:xfrm rot="5400000">
-              <a:off x="965388" y="345695"/>
-              <a:ext cx="1655700" cy="1440600"/>
-            </a:xfrm>
-            <a:prstGeom prst="hexagon">
-              <a:avLst>
-                <a:gd fmla="val 25000" name="adj"/>
-                <a:gd fmla="val 115470" name="vf"/>
-              </a:avLst>
-            </a:prstGeom>
-            <a:solidFill>
-              <a:srgbClr val="38761D"/>
-            </a:solidFill>
-            <a:ln cap="flat" cmpd="sng" w="15875">
-              <a:solidFill>
-                <a:srgbClr val="FFFFFF"/>
-              </a:solidFill>
-              <a:prstDash val="solid"/>
-              <a:round/>
-              <a:headEnd len="sm" w="sm" type="none"/>
-              <a:tailEnd len="sm" w="sm" type="none"/>
-            </a:ln>
-          </p:spPr>
-          <p:txBody>
-            <a:bodyPr anchorCtr="0" anchor="ctr" bIns="68575" lIns="68575" spcFirstLastPara="1" rIns="68575" wrap="square" tIns="68575">
-              <a:noAutofit/>
-            </a:bodyPr>
-            <a:lstStyle/>
-            <a:p>
-              <a:pPr indent="0" lvl="0" marL="0" rtl="0" algn="l">
-                <a:spcBef>
-                  <a:spcPts val="0"/>
-                </a:spcBef>
-                <a:spcAft>
-                  <a:spcPts val="0"/>
-                </a:spcAft>
-                <a:buNone/>
-              </a:pPr>
-              <a:r>
-                <a:t/>
-              </a:r>
-              <a:endParaRPr/>
-            </a:p>
-          </p:txBody>
-        </p:sp>
-        <p:sp>
-          <p:nvSpPr>
-            <p:cNvPr id="151" name="Google Shape;151;p21"/>
-            <p:cNvSpPr txBox="1"/>
-            <p:nvPr/>
-          </p:nvSpPr>
-          <p:spPr>
-            <a:xfrm>
-              <a:off x="1297460" y="739071"/>
-              <a:ext cx="991500" cy="897000"/>
-            </a:xfrm>
-            <a:prstGeom prst="rect">
-              <a:avLst/>
-            </a:prstGeom>
-            <a:solidFill>
-              <a:srgbClr val="38761D"/>
-            </a:solidFill>
-            <a:ln>
-              <a:noFill/>
-            </a:ln>
-          </p:spPr>
-          <p:txBody>
-            <a:bodyPr anchorCtr="0" anchor="ctr" bIns="0" lIns="0" spcFirstLastPara="1" rIns="0" wrap="square" tIns="0">
-              <a:noAutofit/>
-            </a:bodyPr>
-            <a:lstStyle/>
-            <a:p>
-              <a:pPr indent="0" lvl="0" marL="0" marR="0" rtl="0" algn="ctr">
-                <a:lnSpc>
-                  <a:spcPct val="90000"/>
-                </a:lnSpc>
-                <a:spcBef>
-                  <a:spcPts val="0"/>
-                </a:spcBef>
-                <a:spcAft>
-                  <a:spcPts val="0"/>
-                </a:spcAft>
-                <a:buClr>
-                  <a:srgbClr val="000000"/>
-                </a:buClr>
-                <a:buSzPts val="1200"/>
-                <a:buFont typeface="Arial"/>
-                <a:buNone/>
-              </a:pPr>
-              <a:r>
-                <a:rPr b="1" lang="en" sz="1600">
-                  <a:solidFill>
-                    <a:srgbClr val="FFFFFF"/>
-                  </a:solidFill>
-                </a:rPr>
-                <a:t>Eca-nfnet-10</a:t>
-              </a:r>
-              <a:endParaRPr b="1" sz="1500">
-                <a:solidFill>
-                  <a:srgbClr val="FFFFFF"/>
-                </a:solidFill>
-              </a:endParaRPr>
-            </a:p>
-          </p:txBody>
-        </p:sp>
-      </p:grpSp>
-      <p:sp>
-        <p:nvSpPr>
-          <p:cNvPr id="152" name="Google Shape;152;p21"/>
-          <p:cNvSpPr txBox="1"/>
-          <p:nvPr/>
-        </p:nvSpPr>
-        <p:spPr>
-          <a:xfrm>
-            <a:off x="528825" y="-170775"/>
-            <a:ext cx="7649700" cy="635400"/>
-          </a:xfrm>
-          <a:prstGeom prst="rect">
-            <a:avLst/>
-          </a:prstGeom>
-          <a:noFill/>
-          <a:ln>
-            <a:noFill/>
-          </a:ln>
-        </p:spPr>
-        <p:txBody>
-          <a:bodyPr anchorCtr="0" anchor="b" bIns="91425" lIns="91425" spcFirstLastPara="1" rIns="91425" wrap="square" tIns="91425">
-            <a:noAutofit/>
-          </a:bodyPr>
-          <a:lstStyle/>
-          <a:p>
-            <a:pPr indent="0" lvl="0" marL="0" rtl="0" algn="ctr">
-              <a:spcBef>
-                <a:spcPts val="0"/>
-              </a:spcBef>
-              <a:spcAft>
-                <a:spcPts val="0"/>
-              </a:spcAft>
-              <a:buNone/>
-            </a:pPr>
-            <a:r>
-              <a:rPr b="1" lang="en" sz="2500">
-                <a:solidFill>
-                  <a:srgbClr val="FFFFFF"/>
-                </a:solidFill>
-                <a:latin typeface="Roboto Slab"/>
-                <a:ea typeface="Roboto Slab"/>
-                <a:cs typeface="Roboto Slab"/>
-                <a:sym typeface="Roboto Slab"/>
-              </a:rPr>
-              <a:t>Algorithm variations &amp; Evaluation</a:t>
-            </a:r>
-            <a:endParaRPr b="1" sz="2500">
-              <a:solidFill>
-                <a:srgbClr val="FFFFFF"/>
-              </a:solidFill>
-              <a:latin typeface="Roboto Slab"/>
-              <a:ea typeface="Roboto Slab"/>
-              <a:cs typeface="Roboto Slab"/>
-              <a:sym typeface="Roboto Slab"/>
-            </a:endParaRPr>
-          </a:p>
-        </p:txBody>
-      </p:sp>
-      <p:pic>
-        <p:nvPicPr>
-          <p:cNvPr id="153" name="Google Shape;153;p21"/>
-          <p:cNvPicPr preferRelativeResize="0"/>
-          <p:nvPr/>
-        </p:nvPicPr>
-        <p:blipFill>
-          <a:blip r:embed="rId3">
-            <a:alphaModFix/>
-          </a:blip>
-          <a:stretch>
-            <a:fillRect/>
-          </a:stretch>
-        </p:blipFill>
-        <p:spPr>
-          <a:xfrm>
-            <a:off x="6585700" y="1232661"/>
-            <a:ext cx="1534293" cy="744495"/>
-          </a:xfrm>
-          <a:prstGeom prst="rect">
-            <a:avLst/>
-          </a:prstGeom>
-          <a:noFill/>
-          <a:ln>
-            <a:noFill/>
-          </a:ln>
-        </p:spPr>
-      </p:pic>
-      <p:pic>
-        <p:nvPicPr>
-          <p:cNvPr id="154" name="Google Shape;154;p21"/>
-          <p:cNvPicPr preferRelativeResize="0"/>
-          <p:nvPr/>
-        </p:nvPicPr>
-        <p:blipFill>
-          <a:blip r:embed="rId4">
-            <a:alphaModFix/>
-          </a:blip>
-          <a:stretch>
-            <a:fillRect/>
-          </a:stretch>
-        </p:blipFill>
-        <p:spPr>
-          <a:xfrm>
-            <a:off x="4572000" y="680075"/>
-            <a:ext cx="3994926" cy="1704075"/>
-          </a:xfrm>
-          <a:prstGeom prst="rect">
-            <a:avLst/>
-          </a:prstGeom>
-          <a:noFill/>
-          <a:ln>
-            <a:noFill/>
-          </a:ln>
-        </p:spPr>
-      </p:pic>
-      <p:pic>
-        <p:nvPicPr>
-          <p:cNvPr id="155" name="Google Shape;155;p21"/>
-          <p:cNvPicPr preferRelativeResize="0"/>
-          <p:nvPr/>
-        </p:nvPicPr>
-        <p:blipFill>
-          <a:blip r:embed="rId5">
-            <a:alphaModFix/>
-          </a:blip>
-          <a:stretch>
-            <a:fillRect/>
-          </a:stretch>
-        </p:blipFill>
-        <p:spPr>
-          <a:xfrm>
-            <a:off x="4571998" y="2841350"/>
-            <a:ext cx="3994926" cy="2129275"/>
-          </a:xfrm>
-          <a:prstGeom prst="rect">
-            <a:avLst/>
-          </a:prstGeom>
-          <a:noFill/>
-          <a:ln>
-            <a:noFill/>
-          </a:ln>
-        </p:spPr>
-      </p:pic>
-      <p:sp>
-        <p:nvSpPr>
-          <p:cNvPr id="156" name="Google Shape;156;p21"/>
-          <p:cNvSpPr txBox="1"/>
-          <p:nvPr>
-            <p:ph idx="4294967295" type="body"/>
-          </p:nvPr>
-        </p:nvSpPr>
-        <p:spPr>
-          <a:xfrm>
-            <a:off x="4650963" y="314700"/>
-            <a:ext cx="3837000" cy="609000"/>
-          </a:xfrm>
-          <a:prstGeom prst="rect">
-            <a:avLst/>
-          </a:prstGeom>
-        </p:spPr>
-        <p:txBody>
-          <a:bodyPr anchorCtr="0" anchor="t" bIns="91425" lIns="91425" spcFirstLastPara="1" rIns="91425" wrap="square" tIns="91425">
-            <a:noAutofit/>
-          </a:bodyPr>
-          <a:lstStyle/>
-          <a:p>
-            <a:pPr indent="0" lvl="0" marL="0" rtl="0" algn="ctr">
-              <a:spcBef>
-                <a:spcPts val="0"/>
-              </a:spcBef>
-              <a:spcAft>
-                <a:spcPts val="1600"/>
-              </a:spcAft>
-              <a:buNone/>
-            </a:pPr>
-            <a:r>
-              <a:rPr b="1" lang="en" sz="1500">
-                <a:solidFill>
-                  <a:srgbClr val="8BC34A"/>
-                </a:solidFill>
-                <a:latin typeface="Georgia"/>
-                <a:ea typeface="Georgia"/>
-                <a:cs typeface="Georgia"/>
-                <a:sym typeface="Georgia"/>
-              </a:rPr>
-              <a:t>Time-T0-Train ~12-20 Epochs</a:t>
-            </a:r>
-            <a:endParaRPr b="1" sz="1500">
-              <a:solidFill>
-                <a:srgbClr val="8BC34A"/>
-              </a:solidFill>
-              <a:latin typeface="Georgia"/>
-              <a:ea typeface="Georgia"/>
-              <a:cs typeface="Georgia"/>
-              <a:sym typeface="Georgia"/>
-            </a:endParaRPr>
-          </a:p>
-        </p:txBody>
-      </p:sp>
-      <p:sp>
-        <p:nvSpPr>
-          <p:cNvPr id="157" name="Google Shape;157;p21"/>
-          <p:cNvSpPr txBox="1"/>
-          <p:nvPr>
-            <p:ph idx="4294967295" type="body"/>
-          </p:nvPr>
-        </p:nvSpPr>
-        <p:spPr>
-          <a:xfrm>
-            <a:off x="4650950" y="2504100"/>
-            <a:ext cx="3837000" cy="609000"/>
-          </a:xfrm>
-          <a:prstGeom prst="rect">
-            <a:avLst/>
-          </a:prstGeom>
-        </p:spPr>
-        <p:txBody>
-          <a:bodyPr anchorCtr="0" anchor="t" bIns="91425" lIns="91425" spcFirstLastPara="1" rIns="91425" wrap="square" tIns="91425">
-            <a:noAutofit/>
-          </a:bodyPr>
-          <a:lstStyle/>
-          <a:p>
-            <a:pPr indent="0" lvl="0" marL="0" rtl="0" algn="ctr">
-              <a:spcBef>
-                <a:spcPts val="0"/>
-              </a:spcBef>
-              <a:spcAft>
-                <a:spcPts val="1600"/>
-              </a:spcAft>
-              <a:buNone/>
-            </a:pPr>
-            <a:r>
-              <a:rPr b="1" lang="en" sz="1500">
-                <a:solidFill>
-                  <a:srgbClr val="8BC34A"/>
-                </a:solidFill>
-                <a:latin typeface="Georgia"/>
-                <a:ea typeface="Georgia"/>
-                <a:cs typeface="Georgia"/>
-                <a:sym typeface="Georgia"/>
-              </a:rPr>
-              <a:t>F1 Score (Kaggle)</a:t>
-            </a:r>
-            <a:endParaRPr b="1" sz="1500">
-              <a:solidFill>
-                <a:srgbClr val="8BC34A"/>
-              </a:solidFill>
-              <a:latin typeface="Georgia"/>
-              <a:ea typeface="Georgia"/>
-              <a:cs typeface="Georgia"/>
-              <a:sym typeface="Georgia"/>
-            </a:endParaRPr>
-          </a:p>
-        </p:txBody>
-      </p:sp>
-    </p:spTree>
-  </p:cSld>
-  <p:clrMapOvr>
-    <a:masterClrMapping/>
-  </p:clrMapOvr>
-</p:sld>
+          <a:prstDash val="solid"/>
+        </a:ln>
+        <a:ln w="25400" cap="flat" cmpd="sng" algn="ctr">
+          <a:solidFill>
+            <a:schemeClr val="phClr"/>
+          </a:solidFill>
+          <a:prstDash val="solid"/>
+        </a:ln>
+        <a:ln w="38100" cap="flat" cmpd="sng" algn="ctr">
+          <a:solidFill>
+            <a:schemeClr val="phClr"/>
+          </a:solidFill>
+          <a:prstDash val="solid"/>
+        </a:ln>
+      </a:lnStyleLst>
+      <a:effectStyleLst>
+        <a:effectStyle>
+          <a:effectLst>
+            <a:outerShdw blurRad="40000" dist="20000" dir="5400000" rotWithShape="0">
+              <a:srgbClr val="000000">
+                <a:alpha val="38000"/>
+              </a:srgbClr>
+            </a:outerShdw>
+          </a:effectLst>
+        </a:effectStyle>
+        <a:effectStyle>
+          <a:effectLst>
+            <a:outerShdw blurRad="40000" dist="23000" dir="5400000" rotWithShape="0">
+              <a:srgbClr val="000000">
+                <a:alpha val="35000"/>
+              </a:srgbClr>
+            </a:outerShdw>
+          </a:effectLst>
+        </a:effectStyle>
+        <a:effectStyle>
+          <a:effectLst>
+            <a:outerShdw blurRad="40000" dist="23000" dir="5400000" rotWithShape="0">
+              <a:srgbClr val="000000">
+                <a:alpha val="35000"/>
+              </a:srgbClr>
+            </a:outerShdw>
+          </a:effectLst>
+          <a:scene3d>
+            <a:camera prst="orthographicFront">
+              <a:rot lat="0" lon="0" rev="0"/>
+            </a:camera>
+            <a:lightRig rig="threePt" dir="t">
+              <a:rot lat="0" lon="0" rev="1200000"/>
+            </a:lightRig>
+          </a:scene3d>
+          <a:sp3d>
+            <a:bevelT w="63500" h="25400"/>
+          </a:sp3d>
+        </a:effectStyle>
+      </a:effectStyleLst>
+      <a:bgFillStyleLst>
+        <a:solidFill>
+          <a:schemeClr val="phClr"/>
+        </a:solidFill>
+        <a:gradFill rotWithShape="1">
+          <a:gsLst>
+            <a:gs pos="0">
+              <a:schemeClr val="phClr">
+                <a:tint val="40000"/>
+                <a:satMod val="350000"/>
+              </a:schemeClr>
+            </a:gs>
+            <a:gs pos="40000">
+              <a:schemeClr val="phClr">
+                <a:tint val="45000"/>
+                <a:shade val="99000"/>
+                <a:satMod val="350000"/>
+              </a:schemeClr>
+            </a:gs>
+            <a:gs pos="100000">
+              <a:schemeClr val="phClr">
+                <a:shade val="20000"/>
+                <a:satMod val="255000"/>
+              </a:schemeClr>
+            </a:gs>
+          </a:gsLst>
+          <a:path path="circle">
+            <a:fillToRect l="50000" t="-80000" r="50000" b="180000"/>
+          </a:path>
+        </a:gradFill>
+        <a:gradFill rotWithShape="1">
+          <a:gsLst>
+            <a:gs pos="0">
+              <a:schemeClr val="phClr">
+                <a:tint val="80000"/>
+                <a:satMod val="300000"/>
+              </a:schemeClr>
+            </a:gs>
+            <a:gs pos="100000">
+              <a:schemeClr val="phClr">
+                <a:shade val="30000"/>
+                <a:satMod val="200000"/>
+              </a:schemeClr>
+            </a:gs>
+          </a:gsLst>
+          <a:path path="circle">
+            <a:fillToRect l="50000" t="50000" r="50000" b="50000"/>
+          </a:path>
+        </a:gradFill>
+      </a:bgFillStyleLst>
+    </a:fmtScheme>
+  </a:themeElements>
+</a:theme>
 </file>
 
-<file path=ppt/theme/theme1.xml><?xml version="1.0" encoding="utf-8"?>
+<file path=ppt/theme/theme2.xml><?xml version="1.0" encoding="utf-8"?>
 <a:theme xmlns:a="http://schemas.openxmlformats.org/drawingml/2006/main" xmlns:r="http://schemas.openxmlformats.org/officeDocument/2006/relationships">
   <a:themeElements>
     <a:clrScheme name="Default">
@@ -12881,283 +13592,4 @@
     </a:fmtScheme>
   </a:themeElements>
 </a:theme>
-</file>
-
-<file path=ppt/theme/theme2.xml><?xml version="1.0" encoding="utf-8"?>
-<a:theme xmlns:a="http://schemas.openxmlformats.org/drawingml/2006/main" xmlns:r="http://schemas.openxmlformats.org/officeDocument/2006/relationships" name="Spearmint">
-  <a:themeElements>
-    <a:clrScheme name="Spearmint">
-      <a:dk1>
-        <a:srgbClr val="202729"/>
-      </a:dk1>
-      <a:lt1>
-        <a:srgbClr val="FFFFFF"/>
-      </a:lt1>
-      <a:dk2>
-        <a:srgbClr val="4BA173"/>
-      </a:dk2>
-      <a:lt2>
-        <a:srgbClr val="63D297"/>
-      </a:lt2>
-      <a:accent1>
-        <a:srgbClr val="353744"/>
-      </a:accent1>
-      <a:accent2>
-        <a:srgbClr val="424242"/>
-      </a:accent2>
-      <a:accent3>
-        <a:srgbClr val="616161"/>
-      </a:accent3>
-      <a:accent4>
-        <a:srgbClr val="999999"/>
-      </a:accent4>
-      <a:accent5>
-        <a:srgbClr val="FF5252"/>
-      </a:accent5>
-      <a:accent6>
-        <a:srgbClr val="FFF176"/>
-      </a:accent6>
-      <a:hlink>
-        <a:srgbClr val="FF5252"/>
-      </a:hlink>
-      <a:folHlink>
-        <a:srgbClr val="FF5252"/>
-      </a:folHlink>
-    </a:clrScheme>
-    <a:fontScheme name="Office">
-      <a:majorFont>
-        <a:latin typeface="Arial"/>
-        <a:ea typeface=""/>
-        <a:cs typeface=""/>
-        <a:font script="Jpan" typeface="ＭＳ Ｐゴシック"/>
-        <a:font script="Hang" typeface="맑은 고딕"/>
-        <a:font script="Hans" typeface="宋体"/>
-        <a:font script="Hant" typeface="新細明體"/>
-        <a:font script="Arab" typeface="Times New Roman"/>
-        <a:font script="Hebr" typeface="Times New Roman"/>
-        <a:font script="Thai" typeface="Angsana New"/>
-        <a:font script="Ethi" typeface="Nyala"/>
-        <a:font script="Beng" typeface="Vrinda"/>
-        <a:font script="Gujr" typeface="Shruti"/>
-        <a:font script="Khmr" typeface="MoolBoran"/>
-        <a:font script="Knda" typeface="Tunga"/>
-        <a:font script="Guru" typeface="Raavi"/>
-        <a:font script="Cans" typeface="Euphemia"/>
-        <a:font script="Cher" typeface="Plantagenet Cherokee"/>
-        <a:font script="Yiii" typeface="Microsoft Yi Baiti"/>
-        <a:font script="Tibt" typeface="Microsoft Himalaya"/>
-        <a:font script="Thaa" typeface="MV Boli"/>
-        <a:font script="Deva" typeface="Mangal"/>
-        <a:font script="Telu" typeface="Gautami"/>
-        <a:font script="Taml" typeface="Latha"/>
-        <a:font script="Syrc" typeface="Estrangelo Edessa"/>
-        <a:font script="Orya" typeface="Kalinga"/>
-        <a:font script="Mlym" typeface="Kartika"/>
-        <a:font script="Laoo" typeface="DokChampa"/>
-        <a:font script="Sinh" typeface="Iskoola Pota"/>
-        <a:font script="Mong" typeface="Mongolian Baiti"/>
-        <a:font script="Viet" typeface="Times New Roman"/>
-        <a:font script="Uigh" typeface="Microsoft Uighur"/>
-        <a:font script="Geor" typeface="Sylfaen"/>
-      </a:majorFont>
-      <a:minorFont>
-        <a:latin typeface="Arial"/>
-        <a:ea typeface=""/>
-        <a:cs typeface=""/>
-        <a:font script="Jpan" typeface="ＭＳ Ｐゴシック"/>
-        <a:font script="Hang" typeface="맑은 고딕"/>
-        <a:font script="Hans" typeface="宋体"/>
-        <a:font script="Hant" typeface="新細明體"/>
-        <a:font script="Arab" typeface="Arial"/>
-        <a:font script="Hebr" typeface="Arial"/>
-        <a:font script="Thai" typeface="Cordia New"/>
-        <a:font script="Ethi" typeface="Nyala"/>
-        <a:font script="Beng" typeface="Vrinda"/>
-        <a:font script="Gujr" typeface="Shruti"/>
-        <a:font script="Khmr" typeface="DaunPenh"/>
-        <a:font script="Knda" typeface="Tunga"/>
-        <a:font script="Guru" typeface="Raavi"/>
-        <a:font script="Cans" typeface="Euphemia"/>
-        <a:font script="Cher" typeface="Plantagenet Cherokee"/>
-        <a:font script="Yiii" typeface="Microsoft Yi Baiti"/>
-        <a:font script="Tibt" typeface="Microsoft Himalaya"/>
-        <a:font script="Thaa" typeface="MV Boli"/>
-        <a:font script="Deva" typeface="Mangal"/>
-        <a:font script="Telu" typeface="Gautami"/>
-        <a:font script="Taml" typeface="Latha"/>
-        <a:font script="Syrc" typeface="Estrangelo Edessa"/>
-        <a:font script="Orya" typeface="Kalinga"/>
-        <a:font script="Mlym" typeface="Kartika"/>
-        <a:font script="Laoo" typeface="DokChampa"/>
-        <a:font script="Sinh" typeface="Iskoola Pota"/>
-        <a:font script="Mong" typeface="Mongolian Baiti"/>
-        <a:font script="Viet" typeface="Arial"/>
-        <a:font script="Uigh" typeface="Microsoft Uighur"/>
-        <a:font script="Geor" typeface="Sylfaen"/>
-      </a:minorFont>
-    </a:fontScheme>
-    <a:fmtScheme name="Office">
-      <a:fillStyleLst>
-        <a:solidFill>
-          <a:schemeClr val="phClr"/>
-        </a:solidFill>
-        <a:gradFill rotWithShape="1">
-          <a:gsLst>
-            <a:gs pos="0">
-              <a:schemeClr val="phClr">
-                <a:tint val="50000"/>
-                <a:satMod val="300000"/>
-              </a:schemeClr>
-            </a:gs>
-            <a:gs pos="35000">
-              <a:schemeClr val="phClr">
-                <a:tint val="37000"/>
-                <a:satMod val="300000"/>
-              </a:schemeClr>
-            </a:gs>
-            <a:gs pos="100000">
-              <a:schemeClr val="phClr">
-                <a:tint val="15000"/>
-                <a:satMod val="350000"/>
-              </a:schemeClr>
-            </a:gs>
-          </a:gsLst>
-          <a:lin ang="16200000" scaled="1"/>
-        </a:gradFill>
-        <a:gradFill rotWithShape="1">
-          <a:gsLst>
-            <a:gs pos="0">
-              <a:schemeClr val="phClr">
-                <a:tint val="100000"/>
-                <a:shade val="100000"/>
-                <a:satMod val="130000"/>
-              </a:schemeClr>
-            </a:gs>
-            <a:gs pos="100000">
-              <a:schemeClr val="phClr">
-                <a:tint val="50000"/>
-                <a:shade val="100000"/>
-                <a:satMod val="350000"/>
-              </a:schemeClr>
-            </a:gs>
-          </a:gsLst>
-          <a:lin ang="16200000" scaled="0"/>
-        </a:gradFill>
-      </a:fillStyleLst>
-      <a:lnStyleLst>
-        <a:ln w="9525" cap="flat" cmpd="sng" algn="ctr">
-          <a:solidFill>
-            <a:schemeClr val="phClr">
-              <a:shade val="95000"/>
-              <a:satMod val="105000"/>
-            </a:schemeClr>
-          </a:solidFill>
-          <a:prstDash val="solid"/>
-        </a:ln>
-        <a:ln w="25400" cap="flat" cmpd="sng" algn="ctr">
-          <a:solidFill>
-            <a:schemeClr val="phClr"/>
-          </a:solidFill>
-          <a:prstDash val="solid"/>
-        </a:ln>
-        <a:ln w="38100" cap="flat" cmpd="sng" algn="ctr">
-          <a:solidFill>
-            <a:schemeClr val="phClr"/>
-          </a:solidFill>
-          <a:prstDash val="solid"/>
-        </a:ln>
-      </a:lnStyleLst>
-      <a:effectStyleLst>
-        <a:effectStyle>
-          <a:effectLst>
-            <a:outerShdw blurRad="40000" dist="20000" dir="5400000" rotWithShape="0">
-              <a:srgbClr val="000000">
-                <a:alpha val="38000"/>
-              </a:srgbClr>
-            </a:outerShdw>
-          </a:effectLst>
-        </a:effectStyle>
-        <a:effectStyle>
-          <a:effectLst>
-            <a:outerShdw blurRad="40000" dist="23000" dir="5400000" rotWithShape="0">
-              <a:srgbClr val="000000">
-                <a:alpha val="35000"/>
-              </a:srgbClr>
-            </a:outerShdw>
-          </a:effectLst>
-        </a:effectStyle>
-        <a:effectStyle>
-          <a:effectLst>
-            <a:outerShdw blurRad="40000" dist="23000" dir="5400000" rotWithShape="0">
-              <a:srgbClr val="000000">
-                <a:alpha val="35000"/>
-              </a:srgbClr>
-            </a:outerShdw>
-          </a:effectLst>
-          <a:scene3d>
-            <a:camera prst="orthographicFront">
-              <a:rot lat="0" lon="0" rev="0"/>
-            </a:camera>
-            <a:lightRig rig="threePt" dir="t">
-              <a:rot lat="0" lon="0" rev="1200000"/>
-            </a:lightRig>
-          </a:scene3d>
-          <a:sp3d>
-            <a:bevelT w="63500" h="25400"/>
-          </a:sp3d>
-        </a:effectStyle>
-      </a:effectStyleLst>
-      <a:bgFillStyleLst>
-        <a:solidFill>
-          <a:schemeClr val="phClr"/>
-        </a:solidFill>
-        <a:gradFill rotWithShape="1">
-          <a:gsLst>
-            <a:gs pos="0">
-              <a:schemeClr val="phClr">
-                <a:tint val="40000"/>
-                <a:satMod val="350000"/>
-              </a:schemeClr>
-            </a:gs>
-            <a:gs pos="40000">
-              <a:schemeClr val="phClr">
-                <a:tint val="45000"/>
-                <a:shade val="99000"/>
-                <a:satMod val="350000"/>
-              </a:schemeClr>
-            </a:gs>
-            <a:gs pos="100000">
-              <a:schemeClr val="phClr">
-                <a:shade val="20000"/>
-                <a:satMod val="255000"/>
-              </a:schemeClr>
-            </a:gs>
-          </a:gsLst>
-          <a:path path="circle">
-            <a:fillToRect l="50000" t="-80000" r="50000" b="180000"/>
-          </a:path>
-        </a:gradFill>
-        <a:gradFill rotWithShape="1">
-          <a:gsLst>
-            <a:gs pos="0">
-              <a:schemeClr val="phClr">
-                <a:tint val="80000"/>
-                <a:satMod val="300000"/>
-              </a:schemeClr>
-            </a:gs>
-            <a:gs pos="100000">
-              <a:schemeClr val="phClr">
-                <a:shade val="30000"/>
-                <a:satMod val="200000"/>
-              </a:schemeClr>
-            </a:gs>
-          </a:gsLst>
-          <a:path path="circle">
-            <a:fillToRect l="50000" t="50000" r="50000" b="50000"/>
-          </a:path>
-        </a:gradFill>
-      </a:bgFillStyleLst>
-    </a:fmtScheme>
-  </a:themeElements>
-</a:theme>
 </file>
</xml_diff>